<commit_message>
Commiting two hours before I present, everything is all set code wise (for the most part). Still a bug or two, but it is what it is, Finishing up slide show and just geeneral prepping.
</commit_message>
<xml_diff>
--- a/Project_Documents/Final_Project_Presentation.pptx
+++ b/Project_Documents/Final_Project_Presentation.pptx
@@ -109,6 +109,11 @@
       </a:defRPr>
     </a:lvl9pPr>
   </p:defaultTextStyle>
+  <p:extLst>
+    <p:ext uri="{EFAFB233-063F-42B5-8137-9DF3F51BA10A}">
+      <p15:sldGuideLst xmlns:p15="http://schemas.microsoft.com/office/powerpoint/2012/main"/>
+    </p:ext>
+  </p:extLst>
 </p:presentation>
 </file>
 
@@ -259,7 +264,7 @@
           <a:p>
             <a:fld id="{30D33733-AF22-49F8-8583-A9194D0EB77E}" type="datetimeFigureOut">
               <a:rPr lang="en-US" smtClean="0"/>
-              <a:t>12/7/2021</a:t>
+              <a:t>12/9/2021</a:t>
             </a:fld>
             <a:endParaRPr lang="en-US"/>
           </a:p>
@@ -457,7 +462,7 @@
           <a:p>
             <a:fld id="{30D33733-AF22-49F8-8583-A9194D0EB77E}" type="datetimeFigureOut">
               <a:rPr lang="en-US" smtClean="0"/>
-              <a:t>12/7/2021</a:t>
+              <a:t>12/9/2021</a:t>
             </a:fld>
             <a:endParaRPr lang="en-US"/>
           </a:p>
@@ -665,7 +670,7 @@
           <a:p>
             <a:fld id="{30D33733-AF22-49F8-8583-A9194D0EB77E}" type="datetimeFigureOut">
               <a:rPr lang="en-US" smtClean="0"/>
-              <a:t>12/7/2021</a:t>
+              <a:t>12/9/2021</a:t>
             </a:fld>
             <a:endParaRPr lang="en-US"/>
           </a:p>
@@ -863,7 +868,7 @@
           <a:p>
             <a:fld id="{30D33733-AF22-49F8-8583-A9194D0EB77E}" type="datetimeFigureOut">
               <a:rPr lang="en-US" smtClean="0"/>
-              <a:t>12/7/2021</a:t>
+              <a:t>12/9/2021</a:t>
             </a:fld>
             <a:endParaRPr lang="en-US"/>
           </a:p>
@@ -1138,7 +1143,7 @@
           <a:p>
             <a:fld id="{30D33733-AF22-49F8-8583-A9194D0EB77E}" type="datetimeFigureOut">
               <a:rPr lang="en-US" smtClean="0"/>
-              <a:t>12/7/2021</a:t>
+              <a:t>12/9/2021</a:t>
             </a:fld>
             <a:endParaRPr lang="en-US"/>
           </a:p>
@@ -1403,7 +1408,7 @@
           <a:p>
             <a:fld id="{30D33733-AF22-49F8-8583-A9194D0EB77E}" type="datetimeFigureOut">
               <a:rPr lang="en-US" smtClean="0"/>
-              <a:t>12/7/2021</a:t>
+              <a:t>12/9/2021</a:t>
             </a:fld>
             <a:endParaRPr lang="en-US"/>
           </a:p>
@@ -1815,7 +1820,7 @@
           <a:p>
             <a:fld id="{30D33733-AF22-49F8-8583-A9194D0EB77E}" type="datetimeFigureOut">
               <a:rPr lang="en-US" smtClean="0"/>
-              <a:t>12/7/2021</a:t>
+              <a:t>12/9/2021</a:t>
             </a:fld>
             <a:endParaRPr lang="en-US"/>
           </a:p>
@@ -1956,7 +1961,7 @@
           <a:p>
             <a:fld id="{30D33733-AF22-49F8-8583-A9194D0EB77E}" type="datetimeFigureOut">
               <a:rPr lang="en-US" smtClean="0"/>
-              <a:t>12/7/2021</a:t>
+              <a:t>12/9/2021</a:t>
             </a:fld>
             <a:endParaRPr lang="en-US"/>
           </a:p>
@@ -2069,7 +2074,7 @@
           <a:p>
             <a:fld id="{30D33733-AF22-49F8-8583-A9194D0EB77E}" type="datetimeFigureOut">
               <a:rPr lang="en-US" smtClean="0"/>
-              <a:t>12/7/2021</a:t>
+              <a:t>12/9/2021</a:t>
             </a:fld>
             <a:endParaRPr lang="en-US"/>
           </a:p>
@@ -2380,7 +2385,7 @@
           <a:p>
             <a:fld id="{30D33733-AF22-49F8-8583-A9194D0EB77E}" type="datetimeFigureOut">
               <a:rPr lang="en-US" smtClean="0"/>
-              <a:t>12/7/2021</a:t>
+              <a:t>12/9/2021</a:t>
             </a:fld>
             <a:endParaRPr lang="en-US"/>
           </a:p>
@@ -2668,7 +2673,7 @@
           <a:p>
             <a:fld id="{30D33733-AF22-49F8-8583-A9194D0EB77E}" type="datetimeFigureOut">
               <a:rPr lang="en-US" smtClean="0"/>
-              <a:t>12/7/2021</a:t>
+              <a:t>12/9/2021</a:t>
             </a:fld>
             <a:endParaRPr lang="en-US"/>
           </a:p>
@@ -2909,7 +2914,7 @@
           <a:p>
             <a:fld id="{30D33733-AF22-49F8-8583-A9194D0EB77E}" type="datetimeFigureOut">
               <a:rPr lang="en-US" smtClean="0"/>
-              <a:t>12/7/2021</a:t>
+              <a:t>12/9/2021</a:t>
             </a:fld>
             <a:endParaRPr lang="en-US"/>
           </a:p>
@@ -3312,6 +3317,14 @@
 <file path=ppt/slides/slide1.xml><?xml version="1.0" encoding="utf-8"?>
 <p:sld xmlns:a="http://schemas.openxmlformats.org/drawingml/2006/main" xmlns:r="http://schemas.openxmlformats.org/officeDocument/2006/relationships" xmlns:p="http://schemas.openxmlformats.org/presentationml/2006/main">
   <p:cSld>
+    <p:bg>
+      <p:bgPr>
+        <a:solidFill>
+          <a:schemeClr val="bg1"/>
+        </a:solidFill>
+        <a:effectLst/>
+      </p:bgPr>
+    </p:bg>
     <p:spTree>
       <p:nvGrpSpPr>
         <p:cNvPr id="1" name=""/>
@@ -3326,6 +3339,183 @@
           <a:chExt cx="0" cy="0"/>
         </a:xfrm>
       </p:grpSpPr>
+      <p:pic>
+        <p:nvPicPr>
+          <p:cNvPr id="5" name="Picture 4" descr="A plant with leaves&#10;&#10;Description automatically generated with low confidence">
+            <a:extLst>
+              <a:ext uri="{FF2B5EF4-FFF2-40B4-BE49-F238E27FC236}">
+                <a16:creationId xmlns:a16="http://schemas.microsoft.com/office/drawing/2014/main" id="{F97F7DD0-D1D4-4F82-A3DD-17B450F111B2}"/>
+              </a:ext>
+            </a:extLst>
+          </p:cNvPr>
+          <p:cNvPicPr>
+            <a:picLocks noChangeAspect="1"/>
+          </p:cNvPicPr>
+          <p:nvPr/>
+        </p:nvPicPr>
+        <p:blipFill rotWithShape="1">
+          <a:blip r:embed="rId2">
+            <a:extLst>
+              <a:ext uri="{28A0092B-C50C-407E-A947-70E740481C1C}">
+                <a14:useLocalDpi xmlns:a14="http://schemas.microsoft.com/office/drawing/2010/main" val="0"/>
+              </a:ext>
+            </a:extLst>
+          </a:blip>
+          <a:srcRect l="15730"/>
+          <a:stretch/>
+        </p:blipFill>
+        <p:spPr>
+          <a:xfrm rot="5400000">
+            <a:off x="2667000" y="-2667000"/>
+            <a:ext cx="6858000" cy="12192000"/>
+          </a:xfrm>
+          <a:prstGeom prst="rect">
+            <a:avLst/>
+          </a:prstGeom>
+        </p:spPr>
+      </p:pic>
+      <p:sp>
+        <p:nvSpPr>
+          <p:cNvPr id="29" name="Freeform 5">
+            <a:extLst>
+              <a:ext uri="{FF2B5EF4-FFF2-40B4-BE49-F238E27FC236}">
+                <a16:creationId xmlns:a16="http://schemas.microsoft.com/office/drawing/2014/main" id="{87CC2527-562A-4F69-B487-4371E5B243E7}"/>
+              </a:ext>
+              <a:ext uri="{C183D7F6-B498-43B3-948B-1728B52AA6E4}">
+                <adec:decorative xmlns:adec="http://schemas.microsoft.com/office/drawing/2017/decorative" val="1"/>
+              </a:ext>
+            </a:extLst>
+          </p:cNvPr>
+          <p:cNvSpPr>
+            <a:spLocks noGrp="1" noRot="1" noChangeAspect="1" noMove="1" noResize="1" noEditPoints="1" noAdjustHandles="1" noChangeArrowheads="1" noChangeShapeType="1" noTextEdit="1"/>
+          </p:cNvSpPr>
+          <p:nvPr>
+            <p:extLst>
+              <p:ext uri="{386F3935-93C4-4BCD-93E2-E3B085C9AB24}">
+                <p16:designElem xmlns:p16="http://schemas.microsoft.com/office/powerpoint/2015/main" val="1"/>
+              </p:ext>
+            </p:extLst>
+          </p:nvPr>
+        </p:nvSpPr>
+        <p:spPr bwMode="grayWhite">
+          <a:xfrm>
+            <a:off x="7488621" y="2277613"/>
+            <a:ext cx="4703379" cy="4580387"/>
+          </a:xfrm>
+          <a:custGeom>
+            <a:avLst/>
+            <a:gdLst>
+              <a:gd name="T0" fmla="*/ 1333 w 1333"/>
+              <a:gd name="T1" fmla="*/ 1031 h 1298"/>
+              <a:gd name="T2" fmla="*/ 1333 w 1333"/>
+              <a:gd name="T3" fmla="*/ 380 h 1298"/>
+              <a:gd name="T4" fmla="*/ 706 w 1333"/>
+              <a:gd name="T5" fmla="*/ 0 h 1298"/>
+              <a:gd name="T6" fmla="*/ 0 w 1333"/>
+              <a:gd name="T7" fmla="*/ 706 h 1298"/>
+              <a:gd name="T8" fmla="*/ 323 w 1333"/>
+              <a:gd name="T9" fmla="*/ 1298 h 1298"/>
+              <a:gd name="T10" fmla="*/ 1090 w 1333"/>
+              <a:gd name="T11" fmla="*/ 1298 h 1298"/>
+              <a:gd name="T12" fmla="*/ 1333 w 1333"/>
+              <a:gd name="T13" fmla="*/ 1031 h 1298"/>
+            </a:gdLst>
+            <a:ahLst/>
+            <a:cxnLst>
+              <a:cxn ang="0">
+                <a:pos x="T0" y="T1"/>
+              </a:cxn>
+              <a:cxn ang="0">
+                <a:pos x="T2" y="T3"/>
+              </a:cxn>
+              <a:cxn ang="0">
+                <a:pos x="T4" y="T5"/>
+              </a:cxn>
+              <a:cxn ang="0">
+                <a:pos x="T6" y="T7"/>
+              </a:cxn>
+              <a:cxn ang="0">
+                <a:pos x="T8" y="T9"/>
+              </a:cxn>
+              <a:cxn ang="0">
+                <a:pos x="T10" y="T11"/>
+              </a:cxn>
+              <a:cxn ang="0">
+                <a:pos x="T12" y="T13"/>
+              </a:cxn>
+            </a:cxnLst>
+            <a:rect l="0" t="0" r="r" b="b"/>
+            <a:pathLst>
+              <a:path w="1333" h="1298">
+                <a:moveTo>
+                  <a:pt x="1333" y="1031"/>
+                </a:moveTo>
+                <a:cubicBezTo>
+                  <a:pt x="1333" y="380"/>
+                  <a:pt x="1333" y="380"/>
+                  <a:pt x="1333" y="380"/>
+                </a:cubicBezTo>
+                <a:cubicBezTo>
+                  <a:pt x="1215" y="154"/>
+                  <a:pt x="979" y="0"/>
+                  <a:pt x="706" y="0"/>
+                </a:cubicBezTo>
+                <a:cubicBezTo>
+                  <a:pt x="317" y="0"/>
+                  <a:pt x="0" y="316"/>
+                  <a:pt x="0" y="706"/>
+                </a:cubicBezTo>
+                <a:cubicBezTo>
+                  <a:pt x="0" y="954"/>
+                  <a:pt x="129" y="1172"/>
+                  <a:pt x="323" y="1298"/>
+                </a:cubicBezTo>
+                <a:cubicBezTo>
+                  <a:pt x="1090" y="1298"/>
+                  <a:pt x="1090" y="1298"/>
+                  <a:pt x="1090" y="1298"/>
+                </a:cubicBezTo>
+                <a:cubicBezTo>
+                  <a:pt x="1193" y="1232"/>
+                  <a:pt x="1276" y="1140"/>
+                  <a:pt x="1333" y="1031"/>
+                </a:cubicBezTo>
+                <a:close/>
+              </a:path>
+            </a:pathLst>
+          </a:custGeom>
+          <a:solidFill>
+            <a:schemeClr val="bg1">
+              <a:alpha val="70000"/>
+            </a:schemeClr>
+          </a:solidFill>
+          <a:ln w="50800" cap="sq" cmpd="dbl">
+            <a:noFill/>
+            <a:miter lim="800000"/>
+          </a:ln>
+          <a:effectLst/>
+        </p:spPr>
+        <p:txBody>
+          <a:bodyPr vert="horz" lIns="91440" tIns="45720" rIns="91440" bIns="45720" rtlCol="0" anchor="t">
+            <a:normAutofit/>
+          </a:bodyPr>
+          <a:lstStyle/>
+          <a:p>
+            <a:pPr algn="ctr">
+              <a:spcAft>
+                <a:spcPts val="1000"/>
+              </a:spcAft>
+              <a:buClr>
+                <a:schemeClr val="tx1"/>
+              </a:buClr>
+              <a:buSzPct val="100000"/>
+              <a:buFont typeface="Arial"/>
+              <a:buNone/>
+            </a:pPr>
+            <a:endParaRPr lang="en-US" sz="1600" cap="all"/>
+          </a:p>
+        </p:txBody>
+      </p:sp>
       <p:sp>
         <p:nvSpPr>
           <p:cNvPr id="2" name="Title 1">
@@ -3344,41 +3534,8 @@
         </p:nvSpPr>
         <p:spPr>
           <a:xfrm>
-            <a:off x="1524000" y="572117"/>
-            <a:ext cx="9144000" cy="2387600"/>
-          </a:xfrm>
-        </p:spPr>
-        <p:txBody>
-          <a:bodyPr/>
-          <a:lstStyle/>
-          <a:p>
-            <a:r>
-              <a:rPr lang="en-US" dirty="0"/>
-              <a:t>Forager</a:t>
-            </a:r>
-          </a:p>
-        </p:txBody>
-      </p:sp>
-      <p:sp>
-        <p:nvSpPr>
-          <p:cNvPr id="3" name="Subtitle 2">
-            <a:extLst>
-              <a:ext uri="{FF2B5EF4-FFF2-40B4-BE49-F238E27FC236}">
-                <a16:creationId xmlns:a16="http://schemas.microsoft.com/office/drawing/2014/main" id="{BA4660DF-AEC4-4EE0-BDD9-F44E1340F238}"/>
-              </a:ext>
-            </a:extLst>
-          </p:cNvPr>
-          <p:cNvSpPr>
-            <a:spLocks noGrp="1"/>
-          </p:cNvSpPr>
-          <p:nvPr>
-            <p:ph type="subTitle" idx="1"/>
-          </p:nvPr>
-        </p:nvSpPr>
-        <p:spPr>
-          <a:xfrm>
-            <a:off x="1524000" y="2959717"/>
-            <a:ext cx="9144000" cy="1655762"/>
+            <a:off x="8022021" y="3231931"/>
+            <a:ext cx="3852041" cy="1834056"/>
           </a:xfrm>
         </p:spPr>
         <p:txBody>
@@ -3388,24 +3545,115 @@
           <a:lstStyle/>
           <a:p>
             <a:r>
-              <a:rPr lang="en-US" sz="1800" dirty="0"/>
+              <a:rPr lang="en-US" sz="4000"/>
+              <a:t>Forager</a:t>
+            </a:r>
+          </a:p>
+        </p:txBody>
+      </p:sp>
+      <p:sp>
+        <p:nvSpPr>
+          <p:cNvPr id="3" name="Subtitle 2">
+            <a:extLst>
+              <a:ext uri="{FF2B5EF4-FFF2-40B4-BE49-F238E27FC236}">
+                <a16:creationId xmlns:a16="http://schemas.microsoft.com/office/drawing/2014/main" id="{BA4660DF-AEC4-4EE0-BDD9-F44E1340F238}"/>
+              </a:ext>
+            </a:extLst>
+          </p:cNvPr>
+          <p:cNvSpPr>
+            <a:spLocks noGrp="1"/>
+          </p:cNvSpPr>
+          <p:nvPr>
+            <p:ph type="subTitle" idx="1"/>
+          </p:nvPr>
+        </p:nvSpPr>
+        <p:spPr>
+          <a:xfrm>
+            <a:off x="7782910" y="5242675"/>
+            <a:ext cx="4330262" cy="683284"/>
+          </a:xfrm>
+        </p:spPr>
+        <p:txBody>
+          <a:bodyPr>
+            <a:normAutofit/>
+          </a:bodyPr>
+          <a:lstStyle/>
+          <a:p>
+            <a:r>
+              <a:rPr lang="en-US" sz="800"/>
               <a:t>Tylor J. Hanshaw</a:t>
             </a:r>
           </a:p>
           <a:p>
             <a:r>
-              <a:rPr lang="en-US" sz="1800" dirty="0"/>
+              <a:rPr lang="en-US" sz="800"/>
               <a:t>CS480</a:t>
             </a:r>
           </a:p>
           <a:p>
             <a:r>
-              <a:rPr lang="en-US" sz="1800" dirty="0"/>
+              <a:rPr lang="en-US" sz="800"/>
               <a:t>12/9/2021</a:t>
             </a:r>
           </a:p>
         </p:txBody>
       </p:sp>
+      <p:cxnSp>
+        <p:nvCxnSpPr>
+          <p:cNvPr id="31" name="Straight Connector 30">
+            <a:extLst>
+              <a:ext uri="{FF2B5EF4-FFF2-40B4-BE49-F238E27FC236}">
+                <a16:creationId xmlns:a16="http://schemas.microsoft.com/office/drawing/2014/main" id="{BCDAEC91-5BCE-4B55-9CC0-43EF94CB734B}"/>
+              </a:ext>
+              <a:ext uri="{C183D7F6-B498-43B3-948B-1728B52AA6E4}">
+                <adec:decorative xmlns:adec="http://schemas.microsoft.com/office/drawing/2017/decorative" val="1"/>
+              </a:ext>
+            </a:extLst>
+          </p:cNvPr>
+          <p:cNvCxnSpPr>
+            <a:cxnSpLocks noGrp="1" noRot="1" noChangeAspect="1" noMove="1" noResize="1" noEditPoints="1" noAdjustHandles="1" noChangeArrowheads="1" noChangeShapeType="1"/>
+          </p:cNvCxnSpPr>
+          <p:nvPr>
+            <p:extLst>
+              <p:ext uri="{386F3935-93C4-4BCD-93E2-E3B085C9AB24}">
+                <p16:designElem xmlns:p16="http://schemas.microsoft.com/office/powerpoint/2015/main" val="1"/>
+              </p:ext>
+            </p:extLst>
+          </p:nvPr>
+        </p:nvCxnSpPr>
+        <p:spPr>
+          <a:xfrm>
+            <a:off x="9480331" y="5123793"/>
+            <a:ext cx="935420" cy="0"/>
+          </a:xfrm>
+          <a:prstGeom prst="line">
+            <a:avLst/>
+          </a:prstGeom>
+          <a:ln w="25400" cap="sq">
+            <a:solidFill>
+              <a:schemeClr val="tx1">
+                <a:lumMod val="85000"/>
+                <a:lumOff val="15000"/>
+              </a:schemeClr>
+            </a:solidFill>
+            <a:bevel/>
+          </a:ln>
+        </p:spPr>
+        <p:style>
+          <a:lnRef idx="1">
+            <a:schemeClr val="accent1"/>
+          </a:lnRef>
+          <a:fillRef idx="0">
+            <a:schemeClr val="accent1"/>
+          </a:fillRef>
+          <a:effectRef idx="0">
+            <a:schemeClr val="accent1"/>
+          </a:effectRef>
+          <a:fontRef idx="minor">
+            <a:schemeClr val="tx1"/>
+          </a:fontRef>
+        </p:style>
+      </p:cxnSp>
     </p:spTree>
     <p:extLst>
       <p:ext uri="{BB962C8B-B14F-4D97-AF65-F5344CB8AC3E}">
@@ -3416,12 +3664,287 @@
   <p:clrMapOvr>
     <a:masterClrMapping/>
   </p:clrMapOvr>
+  <p:timing>
+    <p:tnLst>
+      <p:par>
+        <p:cTn id="1" dur="indefinite" restart="never" nodeType="tmRoot">
+          <p:childTnLst>
+            <p:seq concurrent="1" nextAc="seek">
+              <p:cTn id="2" dur="indefinite" nodeType="mainSeq">
+                <p:childTnLst>
+                  <p:par>
+                    <p:cTn id="3" fill="hold">
+                      <p:stCondLst>
+                        <p:cond delay="indefinite"/>
+                        <p:cond evt="onBegin" delay="0">
+                          <p:tn val="2"/>
+                        </p:cond>
+                      </p:stCondLst>
+                      <p:childTnLst>
+                        <p:par>
+                          <p:cTn id="4" fill="hold">
+                            <p:stCondLst>
+                              <p:cond delay="0"/>
+                            </p:stCondLst>
+                            <p:childTnLst>
+                              <p:par>
+                                <p:cTn id="5" presetID="10" presetClass="entr" presetSubtype="0" fill="hold" grpId="0" nodeType="withEffect">
+                                  <p:stCondLst>
+                                    <p:cond delay="2000"/>
+                                  </p:stCondLst>
+                                  <p:iterate type="lt">
+                                    <p:tmPct val="10000"/>
+                                  </p:iterate>
+                                  <p:childTnLst>
+                                    <p:set>
+                                      <p:cBhvr>
+                                        <p:cTn id="6" dur="1" fill="hold">
+                                          <p:stCondLst>
+                                            <p:cond delay="0"/>
+                                          </p:stCondLst>
+                                        </p:cTn>
+                                        <p:tgtEl>
+                                          <p:spTgt spid="3">
+                                            <p:txEl>
+                                              <p:pRg st="0" end="0"/>
+                                            </p:txEl>
+                                          </p:spTgt>
+                                        </p:tgtEl>
+                                        <p:attrNameLst>
+                                          <p:attrName>style.visibility</p:attrName>
+                                        </p:attrNameLst>
+                                      </p:cBhvr>
+                                      <p:to>
+                                        <p:strVal val="visible"/>
+                                      </p:to>
+                                    </p:set>
+                                    <p:animEffect transition="in" filter="fade">
+                                      <p:cBhvr>
+                                        <p:cTn id="7" dur="400"/>
+                                        <p:tgtEl>
+                                          <p:spTgt spid="3">
+                                            <p:txEl>
+                                              <p:pRg st="0" end="0"/>
+                                            </p:txEl>
+                                          </p:spTgt>
+                                        </p:tgtEl>
+                                      </p:cBhvr>
+                                    </p:animEffect>
+                                  </p:childTnLst>
+                                </p:cTn>
+                              </p:par>
+                              <p:par>
+                                <p:cTn id="8" presetID="10" presetClass="entr" presetSubtype="0" fill="hold" grpId="0" nodeType="withEffect">
+                                  <p:stCondLst>
+                                    <p:cond delay="1000"/>
+                                  </p:stCondLst>
+                                  <p:iterate type="lt">
+                                    <p:tmPct val="10000"/>
+                                  </p:iterate>
+                                  <p:childTnLst>
+                                    <p:set>
+                                      <p:cBhvr>
+                                        <p:cTn id="9" dur="1" fill="hold">
+                                          <p:stCondLst>
+                                            <p:cond delay="0"/>
+                                          </p:stCondLst>
+                                        </p:cTn>
+                                        <p:tgtEl>
+                                          <p:spTgt spid="2"/>
+                                        </p:tgtEl>
+                                        <p:attrNameLst>
+                                          <p:attrName>style.visibility</p:attrName>
+                                        </p:attrNameLst>
+                                      </p:cBhvr>
+                                      <p:to>
+                                        <p:strVal val="visible"/>
+                                      </p:to>
+                                    </p:set>
+                                    <p:animEffect transition="in" filter="fade">
+                                      <p:cBhvr>
+                                        <p:cTn id="10" dur="400"/>
+                                        <p:tgtEl>
+                                          <p:spTgt spid="2"/>
+                                        </p:tgtEl>
+                                      </p:cBhvr>
+                                    </p:animEffect>
+                                  </p:childTnLst>
+                                </p:cTn>
+                              </p:par>
+                            </p:childTnLst>
+                          </p:cTn>
+                        </p:par>
+                      </p:childTnLst>
+                    </p:cTn>
+                  </p:par>
+                  <p:par>
+                    <p:cTn id="11" fill="hold">
+                      <p:stCondLst>
+                        <p:cond delay="indefinite"/>
+                      </p:stCondLst>
+                      <p:childTnLst>
+                        <p:par>
+                          <p:cTn id="12" fill="hold">
+                            <p:stCondLst>
+                              <p:cond delay="0"/>
+                            </p:stCondLst>
+                            <p:childTnLst>
+                              <p:par>
+                                <p:cTn id="13" presetID="10" presetClass="entr" presetSubtype="0" fill="hold" grpId="0" nodeType="clickEffect">
+                                  <p:stCondLst>
+                                    <p:cond delay="2000"/>
+                                  </p:stCondLst>
+                                  <p:iterate type="lt">
+                                    <p:tmPct val="10000"/>
+                                  </p:iterate>
+                                  <p:childTnLst>
+                                    <p:set>
+                                      <p:cBhvr>
+                                        <p:cTn id="14" dur="1" fill="hold">
+                                          <p:stCondLst>
+                                            <p:cond delay="0"/>
+                                          </p:stCondLst>
+                                        </p:cTn>
+                                        <p:tgtEl>
+                                          <p:spTgt spid="3">
+                                            <p:txEl>
+                                              <p:pRg st="1" end="1"/>
+                                            </p:txEl>
+                                          </p:spTgt>
+                                        </p:tgtEl>
+                                        <p:attrNameLst>
+                                          <p:attrName>style.visibility</p:attrName>
+                                        </p:attrNameLst>
+                                      </p:cBhvr>
+                                      <p:to>
+                                        <p:strVal val="visible"/>
+                                      </p:to>
+                                    </p:set>
+                                    <p:animEffect transition="in" filter="fade">
+                                      <p:cBhvr>
+                                        <p:cTn id="15" dur="400"/>
+                                        <p:tgtEl>
+                                          <p:spTgt spid="3">
+                                            <p:txEl>
+                                              <p:pRg st="1" end="1"/>
+                                            </p:txEl>
+                                          </p:spTgt>
+                                        </p:tgtEl>
+                                      </p:cBhvr>
+                                    </p:animEffect>
+                                  </p:childTnLst>
+                                </p:cTn>
+                              </p:par>
+                            </p:childTnLst>
+                          </p:cTn>
+                        </p:par>
+                      </p:childTnLst>
+                    </p:cTn>
+                  </p:par>
+                  <p:par>
+                    <p:cTn id="16" fill="hold">
+                      <p:stCondLst>
+                        <p:cond delay="indefinite"/>
+                      </p:stCondLst>
+                      <p:childTnLst>
+                        <p:par>
+                          <p:cTn id="17" fill="hold">
+                            <p:stCondLst>
+                              <p:cond delay="0"/>
+                            </p:stCondLst>
+                            <p:childTnLst>
+                              <p:par>
+                                <p:cTn id="18" presetID="10" presetClass="entr" presetSubtype="0" fill="hold" grpId="0" nodeType="clickEffect">
+                                  <p:stCondLst>
+                                    <p:cond delay="2000"/>
+                                  </p:stCondLst>
+                                  <p:iterate type="lt">
+                                    <p:tmPct val="10000"/>
+                                  </p:iterate>
+                                  <p:childTnLst>
+                                    <p:set>
+                                      <p:cBhvr>
+                                        <p:cTn id="19" dur="1" fill="hold">
+                                          <p:stCondLst>
+                                            <p:cond delay="0"/>
+                                          </p:stCondLst>
+                                        </p:cTn>
+                                        <p:tgtEl>
+                                          <p:spTgt spid="3">
+                                            <p:txEl>
+                                              <p:pRg st="2" end="2"/>
+                                            </p:txEl>
+                                          </p:spTgt>
+                                        </p:tgtEl>
+                                        <p:attrNameLst>
+                                          <p:attrName>style.visibility</p:attrName>
+                                        </p:attrNameLst>
+                                      </p:cBhvr>
+                                      <p:to>
+                                        <p:strVal val="visible"/>
+                                      </p:to>
+                                    </p:set>
+                                    <p:animEffect transition="in" filter="fade">
+                                      <p:cBhvr>
+                                        <p:cTn id="20" dur="400"/>
+                                        <p:tgtEl>
+                                          <p:spTgt spid="3">
+                                            <p:txEl>
+                                              <p:pRg st="2" end="2"/>
+                                            </p:txEl>
+                                          </p:spTgt>
+                                        </p:tgtEl>
+                                      </p:cBhvr>
+                                    </p:animEffect>
+                                  </p:childTnLst>
+                                </p:cTn>
+                              </p:par>
+                            </p:childTnLst>
+                          </p:cTn>
+                        </p:par>
+                      </p:childTnLst>
+                    </p:cTn>
+                  </p:par>
+                </p:childTnLst>
+              </p:cTn>
+              <p:prevCondLst>
+                <p:cond evt="onPrev" delay="0">
+                  <p:tgtEl>
+                    <p:sldTgt/>
+                  </p:tgtEl>
+                </p:cond>
+              </p:prevCondLst>
+              <p:nextCondLst>
+                <p:cond evt="onNext" delay="0">
+                  <p:tgtEl>
+                    <p:sldTgt/>
+                  </p:tgtEl>
+                </p:cond>
+              </p:nextCondLst>
+            </p:seq>
+          </p:childTnLst>
+        </p:cTn>
+      </p:par>
+    </p:tnLst>
+    <p:bldLst>
+      <p:bldP spid="2" grpId="0"/>
+      <p:bldP spid="3" grpId="0" build="p"/>
+    </p:bldLst>
+  </p:timing>
 </p:sld>
 </file>
 
 <file path=ppt/slides/slide2.xml><?xml version="1.0" encoding="utf-8"?>
 <p:sld xmlns:a="http://schemas.openxmlformats.org/drawingml/2006/main" xmlns:r="http://schemas.openxmlformats.org/officeDocument/2006/relationships" xmlns:p="http://schemas.openxmlformats.org/presentationml/2006/main">
   <p:cSld>
+    <p:bg>
+      <p:bgPr>
+        <a:solidFill>
+          <a:schemeClr val="bg1"/>
+        </a:solidFill>
+        <a:effectLst/>
+      </p:bgPr>
+    </p:bg>
     <p:spTree>
       <p:nvGrpSpPr>
         <p:cNvPr id="1" name=""/>
@@ -3436,6 +3959,183 @@
           <a:chExt cx="0" cy="0"/>
         </a:xfrm>
       </p:grpSpPr>
+      <p:pic>
+        <p:nvPicPr>
+          <p:cNvPr id="7" name="Picture 6" descr="A close-up of a plant&#10;&#10;Description automatically generated with medium confidence">
+            <a:extLst>
+              <a:ext uri="{FF2B5EF4-FFF2-40B4-BE49-F238E27FC236}">
+                <a16:creationId xmlns:a16="http://schemas.microsoft.com/office/drawing/2014/main" id="{9DE62B2D-488C-440D-BCC3-6B44E3D00F44}"/>
+              </a:ext>
+            </a:extLst>
+          </p:cNvPr>
+          <p:cNvPicPr>
+            <a:picLocks noChangeAspect="1"/>
+          </p:cNvPicPr>
+          <p:nvPr/>
+        </p:nvPicPr>
+        <p:blipFill rotWithShape="1">
+          <a:blip r:embed="rId2">
+            <a:extLst>
+              <a:ext uri="{28A0092B-C50C-407E-A947-70E740481C1C}">
+                <a14:useLocalDpi xmlns:a14="http://schemas.microsoft.com/office/drawing/2010/main" val="0"/>
+              </a:ext>
+            </a:extLst>
+          </a:blip>
+          <a:srcRect r="15730"/>
+          <a:stretch/>
+        </p:blipFill>
+        <p:spPr>
+          <a:xfrm rot="16200000">
+            <a:off x="2666999" y="-2667000"/>
+            <a:ext cx="6858000" cy="12192000"/>
+          </a:xfrm>
+          <a:prstGeom prst="rect">
+            <a:avLst/>
+          </a:prstGeom>
+        </p:spPr>
+      </p:pic>
+      <p:sp>
+        <p:nvSpPr>
+          <p:cNvPr id="12" name="Freeform 5">
+            <a:extLst>
+              <a:ext uri="{FF2B5EF4-FFF2-40B4-BE49-F238E27FC236}">
+                <a16:creationId xmlns:a16="http://schemas.microsoft.com/office/drawing/2014/main" id="{3CD9DF72-87A3-404E-A828-84CBF11A8303}"/>
+              </a:ext>
+              <a:ext uri="{C183D7F6-B498-43B3-948B-1728B52AA6E4}">
+                <adec:decorative xmlns:adec="http://schemas.microsoft.com/office/drawing/2017/decorative" val="1"/>
+              </a:ext>
+            </a:extLst>
+          </p:cNvPr>
+          <p:cNvSpPr>
+            <a:spLocks noGrp="1" noRot="1" noChangeAspect="1" noMove="1" noResize="1" noEditPoints="1" noAdjustHandles="1" noChangeArrowheads="1" noChangeShapeType="1" noTextEdit="1"/>
+          </p:cNvSpPr>
+          <p:nvPr>
+            <p:extLst>
+              <p:ext uri="{386F3935-93C4-4BCD-93E2-E3B085C9AB24}">
+                <p16:designElem xmlns:p16="http://schemas.microsoft.com/office/powerpoint/2015/main" val="1"/>
+              </p:ext>
+            </p:extLst>
+          </p:nvPr>
+        </p:nvSpPr>
+        <p:spPr bwMode="grayWhite">
+          <a:xfrm flipH="1">
+            <a:off x="0" y="998175"/>
+            <a:ext cx="6017172" cy="5859825"/>
+          </a:xfrm>
+          <a:custGeom>
+            <a:avLst/>
+            <a:gdLst>
+              <a:gd name="T0" fmla="*/ 1333 w 1333"/>
+              <a:gd name="T1" fmla="*/ 1031 h 1298"/>
+              <a:gd name="T2" fmla="*/ 1333 w 1333"/>
+              <a:gd name="T3" fmla="*/ 380 h 1298"/>
+              <a:gd name="T4" fmla="*/ 706 w 1333"/>
+              <a:gd name="T5" fmla="*/ 0 h 1298"/>
+              <a:gd name="T6" fmla="*/ 0 w 1333"/>
+              <a:gd name="T7" fmla="*/ 706 h 1298"/>
+              <a:gd name="T8" fmla="*/ 323 w 1333"/>
+              <a:gd name="T9" fmla="*/ 1298 h 1298"/>
+              <a:gd name="T10" fmla="*/ 1090 w 1333"/>
+              <a:gd name="T11" fmla="*/ 1298 h 1298"/>
+              <a:gd name="T12" fmla="*/ 1333 w 1333"/>
+              <a:gd name="T13" fmla="*/ 1031 h 1298"/>
+            </a:gdLst>
+            <a:ahLst/>
+            <a:cxnLst>
+              <a:cxn ang="0">
+                <a:pos x="T0" y="T1"/>
+              </a:cxn>
+              <a:cxn ang="0">
+                <a:pos x="T2" y="T3"/>
+              </a:cxn>
+              <a:cxn ang="0">
+                <a:pos x="T4" y="T5"/>
+              </a:cxn>
+              <a:cxn ang="0">
+                <a:pos x="T6" y="T7"/>
+              </a:cxn>
+              <a:cxn ang="0">
+                <a:pos x="T8" y="T9"/>
+              </a:cxn>
+              <a:cxn ang="0">
+                <a:pos x="T10" y="T11"/>
+              </a:cxn>
+              <a:cxn ang="0">
+                <a:pos x="T12" y="T13"/>
+              </a:cxn>
+            </a:cxnLst>
+            <a:rect l="0" t="0" r="r" b="b"/>
+            <a:pathLst>
+              <a:path w="1333" h="1298">
+                <a:moveTo>
+                  <a:pt x="1333" y="1031"/>
+                </a:moveTo>
+                <a:cubicBezTo>
+                  <a:pt x="1333" y="380"/>
+                  <a:pt x="1333" y="380"/>
+                  <a:pt x="1333" y="380"/>
+                </a:cubicBezTo>
+                <a:cubicBezTo>
+                  <a:pt x="1215" y="154"/>
+                  <a:pt x="979" y="0"/>
+                  <a:pt x="706" y="0"/>
+                </a:cubicBezTo>
+                <a:cubicBezTo>
+                  <a:pt x="317" y="0"/>
+                  <a:pt x="0" y="316"/>
+                  <a:pt x="0" y="706"/>
+                </a:cubicBezTo>
+                <a:cubicBezTo>
+                  <a:pt x="0" y="954"/>
+                  <a:pt x="129" y="1172"/>
+                  <a:pt x="323" y="1298"/>
+                </a:cubicBezTo>
+                <a:cubicBezTo>
+                  <a:pt x="1090" y="1298"/>
+                  <a:pt x="1090" y="1298"/>
+                  <a:pt x="1090" y="1298"/>
+                </a:cubicBezTo>
+                <a:cubicBezTo>
+                  <a:pt x="1193" y="1232"/>
+                  <a:pt x="1276" y="1140"/>
+                  <a:pt x="1333" y="1031"/>
+                </a:cubicBezTo>
+                <a:close/>
+              </a:path>
+            </a:pathLst>
+          </a:custGeom>
+          <a:solidFill>
+            <a:schemeClr val="bg1">
+              <a:alpha val="75000"/>
+            </a:schemeClr>
+          </a:solidFill>
+          <a:ln w="50800" cap="sq" cmpd="dbl">
+            <a:noFill/>
+            <a:miter lim="800000"/>
+          </a:ln>
+          <a:effectLst/>
+        </p:spPr>
+        <p:txBody>
+          <a:bodyPr vert="horz" lIns="91440" tIns="45720" rIns="91440" bIns="45720" rtlCol="0" anchor="t">
+            <a:normAutofit/>
+          </a:bodyPr>
+          <a:lstStyle/>
+          <a:p>
+            <a:pPr algn="ctr">
+              <a:spcAft>
+                <a:spcPts val="1000"/>
+              </a:spcAft>
+              <a:buClr>
+                <a:schemeClr val="tx1"/>
+              </a:buClr>
+              <a:buSzPct val="100000"/>
+              <a:buFont typeface="Arial"/>
+              <a:buNone/>
+            </a:pPr>
+            <a:endParaRPr lang="en-US" sz="1600" cap="all"/>
+          </a:p>
+        </p:txBody>
+      </p:sp>
       <p:sp>
         <p:nvSpPr>
           <p:cNvPr id="2" name="Title 1">
@@ -3452,18 +4152,82 @@
             <p:ph type="title"/>
           </p:nvPr>
         </p:nvSpPr>
-        <p:spPr/>
-        <p:txBody>
-          <a:bodyPr/>
-          <a:lstStyle/>
-          <a:p>
-            <a:r>
-              <a:rPr lang="en-US" dirty="0"/>
+        <p:spPr>
+          <a:xfrm>
+            <a:off x="709448" y="1913950"/>
+            <a:ext cx="4204137" cy="1342754"/>
+          </a:xfrm>
+        </p:spPr>
+        <p:txBody>
+          <a:bodyPr>
+            <a:normAutofit/>
+          </a:bodyPr>
+          <a:lstStyle/>
+          <a:p>
+            <a:pPr algn="ctr"/>
+            <a:r>
+              <a:rPr lang="en-US" sz="3600"/>
               <a:t>What is Forager? What does it do?</a:t>
             </a:r>
           </a:p>
         </p:txBody>
       </p:sp>
+      <p:cxnSp>
+        <p:nvCxnSpPr>
+          <p:cNvPr id="14" name="Straight Connector 13">
+            <a:extLst>
+              <a:ext uri="{FF2B5EF4-FFF2-40B4-BE49-F238E27FC236}">
+                <a16:creationId xmlns:a16="http://schemas.microsoft.com/office/drawing/2014/main" id="{20E3A342-4D61-4E3F-AF90-1AB42AEB96CC}"/>
+              </a:ext>
+              <a:ext uri="{C183D7F6-B498-43B3-948B-1728B52AA6E4}">
+                <adec:decorative xmlns:adec="http://schemas.microsoft.com/office/drawing/2017/decorative" val="1"/>
+              </a:ext>
+            </a:extLst>
+          </p:cNvPr>
+          <p:cNvCxnSpPr>
+            <a:cxnSpLocks noGrp="1" noRot="1" noChangeAspect="1" noMove="1" noResize="1" noEditPoints="1" noAdjustHandles="1" noChangeArrowheads="1" noChangeShapeType="1"/>
+          </p:cNvCxnSpPr>
+          <p:nvPr>
+            <p:extLst>
+              <p:ext uri="{386F3935-93C4-4BCD-93E2-E3B085C9AB24}">
+                <p16:designElem xmlns:p16="http://schemas.microsoft.com/office/powerpoint/2015/main" val="1"/>
+              </p:ext>
+            </p:extLst>
+          </p:nvPr>
+        </p:nvCxnSpPr>
+        <p:spPr>
+          <a:xfrm>
+            <a:off x="2287051" y="3337139"/>
+            <a:ext cx="935420" cy="0"/>
+          </a:xfrm>
+          <a:prstGeom prst="line">
+            <a:avLst/>
+          </a:prstGeom>
+          <a:ln w="25400" cap="sq">
+            <a:solidFill>
+              <a:schemeClr val="tx1">
+                <a:lumMod val="85000"/>
+                <a:lumOff val="15000"/>
+              </a:schemeClr>
+            </a:solidFill>
+            <a:bevel/>
+          </a:ln>
+        </p:spPr>
+        <p:style>
+          <a:lnRef idx="1">
+            <a:schemeClr val="accent1"/>
+          </a:lnRef>
+          <a:fillRef idx="0">
+            <a:schemeClr val="accent1"/>
+          </a:fillRef>
+          <a:effectRef idx="0">
+            <a:schemeClr val="accent1"/>
+          </a:effectRef>
+          <a:fontRef idx="minor">
+            <a:schemeClr val="tx1"/>
+          </a:fontRef>
+        </p:style>
+      </p:cxnSp>
       <p:sp>
         <p:nvSpPr>
           <p:cNvPr id="3" name="Content Placeholder 2">
@@ -3480,81 +4244,60 @@
             <p:ph idx="1"/>
           </p:nvPr>
         </p:nvSpPr>
-        <p:spPr/>
-        <p:txBody>
-          <a:bodyPr/>
+        <p:spPr>
+          <a:xfrm>
+            <a:off x="525516" y="3417573"/>
+            <a:ext cx="4593021" cy="2619839"/>
+          </a:xfrm>
+        </p:spPr>
+        <p:txBody>
+          <a:bodyPr anchor="ctr">
+            <a:normAutofit/>
+          </a:bodyPr>
           <a:lstStyle/>
           <a:p>
             <a:pPr marL="0" indent="0">
-              <a:lnSpc>
-                <a:spcPct val="150000"/>
-              </a:lnSpc>
               <a:buNone/>
             </a:pPr>
-            <a:endParaRPr lang="en-US" dirty="0"/>
-          </a:p>
-          <a:p>
-            <a:pPr>
-              <a:lnSpc>
-                <a:spcPct val="150000"/>
-              </a:lnSpc>
-            </a:pPr>
-            <a:r>
-              <a:rPr lang="en-US" dirty="0"/>
+            <a:endParaRPr lang="en-US" sz="1700"/>
+          </a:p>
+          <a:p>
+            <a:r>
+              <a:rPr lang="en-US" sz="1700"/>
               <a:t>Helps keep track of plants found while foraging by:</a:t>
             </a:r>
           </a:p>
           <a:p>
-            <a:pPr lvl="1">
-              <a:lnSpc>
-                <a:spcPct val="150000"/>
-              </a:lnSpc>
-            </a:pPr>
-            <a:r>
-              <a:rPr lang="en-US" dirty="0"/>
+            <a:pPr lvl="1"/>
+            <a:r>
+              <a:rPr lang="en-US" sz="1700"/>
               <a:t>Pinning exact location of the plant you found on Google Maps</a:t>
             </a:r>
           </a:p>
           <a:p>
-            <a:pPr lvl="1">
-              <a:lnSpc>
-                <a:spcPct val="150000"/>
-              </a:lnSpc>
-            </a:pPr>
-            <a:r>
-              <a:rPr lang="en-US" dirty="0"/>
+            <a:pPr lvl="1"/>
+            <a:r>
+              <a:rPr lang="en-US" sz="1700"/>
               <a:t>Giving you a short descripting of the plant</a:t>
             </a:r>
           </a:p>
           <a:p>
-            <a:pPr lvl="1">
-              <a:lnSpc>
-                <a:spcPct val="150000"/>
-              </a:lnSpc>
-            </a:pPr>
-            <a:r>
-              <a:rPr lang="en-US" dirty="0"/>
+            <a:pPr lvl="1"/>
+            <a:r>
+              <a:rPr lang="en-US" sz="1700"/>
               <a:t>Capturing a photo of the plant </a:t>
             </a:r>
           </a:p>
           <a:p>
-            <a:pPr lvl="1">
-              <a:lnSpc>
-                <a:spcPct val="150000"/>
-              </a:lnSpc>
-            </a:pPr>
-            <a:r>
-              <a:rPr lang="en-US" dirty="0"/>
-              <a:t>Allowing the user to leave personal notes about the plant and it’s location</a:t>
-            </a:r>
-          </a:p>
-          <a:p>
-            <a:pPr lvl="1">
-              <a:lnSpc>
-                <a:spcPct val="150000"/>
-              </a:lnSpc>
-            </a:pPr>
-            <a:endParaRPr lang="en-US" dirty="0"/>
+            <a:pPr lvl="1"/>
+            <a:r>
+              <a:rPr lang="en-US" sz="1700"/>
+              <a:t>Allowing the user to leave personal notes about the plant and its location</a:t>
+            </a:r>
+          </a:p>
+          <a:p>
+            <a:pPr lvl="1"/>
+            <a:endParaRPr lang="en-US" sz="1700"/>
           </a:p>
         </p:txBody>
       </p:sp>
@@ -3574,6 +4317,14 @@
 <file path=ppt/slides/slide3.xml><?xml version="1.0" encoding="utf-8"?>
 <p:sld xmlns:a="http://schemas.openxmlformats.org/drawingml/2006/main" xmlns:r="http://schemas.openxmlformats.org/officeDocument/2006/relationships" xmlns:p="http://schemas.openxmlformats.org/presentationml/2006/main">
   <p:cSld>
+    <p:bg>
+      <p:bgPr>
+        <a:solidFill>
+          <a:schemeClr val="bg1"/>
+        </a:solidFill>
+        <a:effectLst/>
+      </p:bgPr>
+    </p:bg>
     <p:spTree>
       <p:nvGrpSpPr>
         <p:cNvPr id="1" name=""/>
@@ -3588,6 +4339,183 @@
           <a:chExt cx="0" cy="0"/>
         </a:xfrm>
       </p:grpSpPr>
+      <p:pic>
+        <p:nvPicPr>
+          <p:cNvPr id="5" name="Picture 4" descr="A plant with leaves&#10;&#10;Description automatically generated with low confidence">
+            <a:extLst>
+              <a:ext uri="{FF2B5EF4-FFF2-40B4-BE49-F238E27FC236}">
+                <a16:creationId xmlns:a16="http://schemas.microsoft.com/office/drawing/2014/main" id="{F759F40B-F2CE-45D9-AB90-CCAF793D10D9}"/>
+              </a:ext>
+            </a:extLst>
+          </p:cNvPr>
+          <p:cNvPicPr>
+            <a:picLocks noChangeAspect="1"/>
+          </p:cNvPicPr>
+          <p:nvPr/>
+        </p:nvPicPr>
+        <p:blipFill rotWithShape="1">
+          <a:blip r:embed="rId2">
+            <a:extLst>
+              <a:ext uri="{28A0092B-C50C-407E-A947-70E740481C1C}">
+                <a14:useLocalDpi xmlns:a14="http://schemas.microsoft.com/office/drawing/2010/main" val="0"/>
+              </a:ext>
+            </a:extLst>
+          </a:blip>
+          <a:srcRect l="15730"/>
+          <a:stretch/>
+        </p:blipFill>
+        <p:spPr>
+          <a:xfrm rot="5400000">
+            <a:off x="2666999" y="-2667000"/>
+            <a:ext cx="6858000" cy="12192000"/>
+          </a:xfrm>
+          <a:prstGeom prst="rect">
+            <a:avLst/>
+          </a:prstGeom>
+        </p:spPr>
+      </p:pic>
+      <p:sp>
+        <p:nvSpPr>
+          <p:cNvPr id="10" name="Freeform 5">
+            <a:extLst>
+              <a:ext uri="{FF2B5EF4-FFF2-40B4-BE49-F238E27FC236}">
+                <a16:creationId xmlns:a16="http://schemas.microsoft.com/office/drawing/2014/main" id="{3CD9DF72-87A3-404E-A828-84CBF11A8303}"/>
+              </a:ext>
+              <a:ext uri="{C183D7F6-B498-43B3-948B-1728B52AA6E4}">
+                <adec:decorative xmlns:adec="http://schemas.microsoft.com/office/drawing/2017/decorative" val="1"/>
+              </a:ext>
+            </a:extLst>
+          </p:cNvPr>
+          <p:cNvSpPr>
+            <a:spLocks noGrp="1" noRot="1" noChangeAspect="1" noMove="1" noResize="1" noEditPoints="1" noAdjustHandles="1" noChangeArrowheads="1" noChangeShapeType="1" noTextEdit="1"/>
+          </p:cNvSpPr>
+          <p:nvPr>
+            <p:extLst>
+              <p:ext uri="{386F3935-93C4-4BCD-93E2-E3B085C9AB24}">
+                <p16:designElem xmlns:p16="http://schemas.microsoft.com/office/powerpoint/2015/main" val="1"/>
+              </p:ext>
+            </p:extLst>
+          </p:nvPr>
+        </p:nvSpPr>
+        <p:spPr bwMode="grayWhite">
+          <a:xfrm flipH="1">
+            <a:off x="0" y="998175"/>
+            <a:ext cx="6017172" cy="5859825"/>
+          </a:xfrm>
+          <a:custGeom>
+            <a:avLst/>
+            <a:gdLst>
+              <a:gd name="T0" fmla="*/ 1333 w 1333"/>
+              <a:gd name="T1" fmla="*/ 1031 h 1298"/>
+              <a:gd name="T2" fmla="*/ 1333 w 1333"/>
+              <a:gd name="T3" fmla="*/ 380 h 1298"/>
+              <a:gd name="T4" fmla="*/ 706 w 1333"/>
+              <a:gd name="T5" fmla="*/ 0 h 1298"/>
+              <a:gd name="T6" fmla="*/ 0 w 1333"/>
+              <a:gd name="T7" fmla="*/ 706 h 1298"/>
+              <a:gd name="T8" fmla="*/ 323 w 1333"/>
+              <a:gd name="T9" fmla="*/ 1298 h 1298"/>
+              <a:gd name="T10" fmla="*/ 1090 w 1333"/>
+              <a:gd name="T11" fmla="*/ 1298 h 1298"/>
+              <a:gd name="T12" fmla="*/ 1333 w 1333"/>
+              <a:gd name="T13" fmla="*/ 1031 h 1298"/>
+            </a:gdLst>
+            <a:ahLst/>
+            <a:cxnLst>
+              <a:cxn ang="0">
+                <a:pos x="T0" y="T1"/>
+              </a:cxn>
+              <a:cxn ang="0">
+                <a:pos x="T2" y="T3"/>
+              </a:cxn>
+              <a:cxn ang="0">
+                <a:pos x="T4" y="T5"/>
+              </a:cxn>
+              <a:cxn ang="0">
+                <a:pos x="T6" y="T7"/>
+              </a:cxn>
+              <a:cxn ang="0">
+                <a:pos x="T8" y="T9"/>
+              </a:cxn>
+              <a:cxn ang="0">
+                <a:pos x="T10" y="T11"/>
+              </a:cxn>
+              <a:cxn ang="0">
+                <a:pos x="T12" y="T13"/>
+              </a:cxn>
+            </a:cxnLst>
+            <a:rect l="0" t="0" r="r" b="b"/>
+            <a:pathLst>
+              <a:path w="1333" h="1298">
+                <a:moveTo>
+                  <a:pt x="1333" y="1031"/>
+                </a:moveTo>
+                <a:cubicBezTo>
+                  <a:pt x="1333" y="380"/>
+                  <a:pt x="1333" y="380"/>
+                  <a:pt x="1333" y="380"/>
+                </a:cubicBezTo>
+                <a:cubicBezTo>
+                  <a:pt x="1215" y="154"/>
+                  <a:pt x="979" y="0"/>
+                  <a:pt x="706" y="0"/>
+                </a:cubicBezTo>
+                <a:cubicBezTo>
+                  <a:pt x="317" y="0"/>
+                  <a:pt x="0" y="316"/>
+                  <a:pt x="0" y="706"/>
+                </a:cubicBezTo>
+                <a:cubicBezTo>
+                  <a:pt x="0" y="954"/>
+                  <a:pt x="129" y="1172"/>
+                  <a:pt x="323" y="1298"/>
+                </a:cubicBezTo>
+                <a:cubicBezTo>
+                  <a:pt x="1090" y="1298"/>
+                  <a:pt x="1090" y="1298"/>
+                  <a:pt x="1090" y="1298"/>
+                </a:cubicBezTo>
+                <a:cubicBezTo>
+                  <a:pt x="1193" y="1232"/>
+                  <a:pt x="1276" y="1140"/>
+                  <a:pt x="1333" y="1031"/>
+                </a:cubicBezTo>
+                <a:close/>
+              </a:path>
+            </a:pathLst>
+          </a:custGeom>
+          <a:solidFill>
+            <a:schemeClr val="bg1">
+              <a:alpha val="75000"/>
+            </a:schemeClr>
+          </a:solidFill>
+          <a:ln w="50800" cap="sq" cmpd="dbl">
+            <a:noFill/>
+            <a:miter lim="800000"/>
+          </a:ln>
+          <a:effectLst/>
+        </p:spPr>
+        <p:txBody>
+          <a:bodyPr vert="horz" lIns="91440" tIns="45720" rIns="91440" bIns="45720" rtlCol="0" anchor="t">
+            <a:normAutofit/>
+          </a:bodyPr>
+          <a:lstStyle/>
+          <a:p>
+            <a:pPr algn="ctr">
+              <a:spcAft>
+                <a:spcPts val="1000"/>
+              </a:spcAft>
+              <a:buClr>
+                <a:schemeClr val="tx1"/>
+              </a:buClr>
+              <a:buSzPct val="100000"/>
+              <a:buFont typeface="Arial"/>
+              <a:buNone/>
+            </a:pPr>
+            <a:endParaRPr lang="en-US" sz="1600" cap="all"/>
+          </a:p>
+        </p:txBody>
+      </p:sp>
       <p:sp>
         <p:nvSpPr>
           <p:cNvPr id="2" name="Title 1">
@@ -3604,18 +4532,82 @@
             <p:ph type="title"/>
           </p:nvPr>
         </p:nvSpPr>
-        <p:spPr/>
-        <p:txBody>
-          <a:bodyPr/>
-          <a:lstStyle/>
-          <a:p>
-            <a:r>
-              <a:rPr lang="en-US" dirty="0"/>
+        <p:spPr>
+          <a:xfrm>
+            <a:off x="709448" y="1913950"/>
+            <a:ext cx="4204137" cy="1342754"/>
+          </a:xfrm>
+        </p:spPr>
+        <p:txBody>
+          <a:bodyPr>
+            <a:normAutofit/>
+          </a:bodyPr>
+          <a:lstStyle/>
+          <a:p>
+            <a:pPr algn="ctr"/>
+            <a:r>
+              <a:rPr lang="en-US" sz="3600"/>
               <a:t>Architecture</a:t>
             </a:r>
           </a:p>
         </p:txBody>
       </p:sp>
+      <p:cxnSp>
+        <p:nvCxnSpPr>
+          <p:cNvPr id="12" name="Straight Connector 11">
+            <a:extLst>
+              <a:ext uri="{FF2B5EF4-FFF2-40B4-BE49-F238E27FC236}">
+                <a16:creationId xmlns:a16="http://schemas.microsoft.com/office/drawing/2014/main" id="{20E3A342-4D61-4E3F-AF90-1AB42AEB96CC}"/>
+              </a:ext>
+              <a:ext uri="{C183D7F6-B498-43B3-948B-1728B52AA6E4}">
+                <adec:decorative xmlns:adec="http://schemas.microsoft.com/office/drawing/2017/decorative" val="1"/>
+              </a:ext>
+            </a:extLst>
+          </p:cNvPr>
+          <p:cNvCxnSpPr>
+            <a:cxnSpLocks noGrp="1" noRot="1" noChangeAspect="1" noMove="1" noResize="1" noEditPoints="1" noAdjustHandles="1" noChangeArrowheads="1" noChangeShapeType="1"/>
+          </p:cNvCxnSpPr>
+          <p:nvPr>
+            <p:extLst>
+              <p:ext uri="{386F3935-93C4-4BCD-93E2-E3B085C9AB24}">
+                <p16:designElem xmlns:p16="http://schemas.microsoft.com/office/powerpoint/2015/main" val="1"/>
+              </p:ext>
+            </p:extLst>
+          </p:nvPr>
+        </p:nvCxnSpPr>
+        <p:spPr>
+          <a:xfrm>
+            <a:off x="2287051" y="3337139"/>
+            <a:ext cx="935420" cy="0"/>
+          </a:xfrm>
+          <a:prstGeom prst="line">
+            <a:avLst/>
+          </a:prstGeom>
+          <a:ln w="25400" cap="sq">
+            <a:solidFill>
+              <a:schemeClr val="tx1">
+                <a:lumMod val="85000"/>
+                <a:lumOff val="15000"/>
+              </a:schemeClr>
+            </a:solidFill>
+            <a:bevel/>
+          </a:ln>
+        </p:spPr>
+        <p:style>
+          <a:lnRef idx="1">
+            <a:schemeClr val="accent1"/>
+          </a:lnRef>
+          <a:fillRef idx="0">
+            <a:schemeClr val="accent1"/>
+          </a:fillRef>
+          <a:effectRef idx="0">
+            <a:schemeClr val="accent1"/>
+          </a:effectRef>
+          <a:fontRef idx="minor">
+            <a:schemeClr val="tx1"/>
+          </a:fontRef>
+        </p:style>
+      </p:cxnSp>
       <p:sp>
         <p:nvSpPr>
           <p:cNvPr id="3" name="Content Placeholder 2">
@@ -3632,73 +4624,53 @@
             <p:ph idx="1"/>
           </p:nvPr>
         </p:nvSpPr>
-        <p:spPr/>
-        <p:txBody>
-          <a:bodyPr/>
-          <a:lstStyle/>
-          <a:p>
-            <a:pPr>
-              <a:lnSpc>
-                <a:spcPct val="150000"/>
-              </a:lnSpc>
-            </a:pPr>
-            <a:r>
-              <a:rPr lang="en-US" dirty="0"/>
+        <p:spPr>
+          <a:xfrm>
+            <a:off x="525516" y="3417573"/>
+            <a:ext cx="4593021" cy="2619839"/>
+          </a:xfrm>
+        </p:spPr>
+        <p:txBody>
+          <a:bodyPr anchor="ctr">
+            <a:normAutofit/>
+          </a:bodyPr>
+          <a:lstStyle/>
+          <a:p>
+            <a:r>
+              <a:rPr lang="en-US" sz="1800"/>
               <a:t>MVVM (Model, View, View-Model)</a:t>
             </a:r>
           </a:p>
           <a:p>
-            <a:pPr lvl="1">
-              <a:lnSpc>
-                <a:spcPct val="150000"/>
-              </a:lnSpc>
-            </a:pPr>
-            <a:r>
-              <a:rPr lang="en-US" dirty="0"/>
+            <a:pPr lvl="1"/>
+            <a:r>
+              <a:rPr lang="en-US" sz="1800"/>
               <a:t>Separation of concerns</a:t>
             </a:r>
           </a:p>
           <a:p>
-            <a:pPr>
-              <a:lnSpc>
-                <a:spcPct val="150000"/>
-              </a:lnSpc>
-            </a:pPr>
-            <a:r>
-              <a:rPr lang="en-US" dirty="0"/>
+            <a:r>
+              <a:rPr lang="en-US" sz="1800"/>
               <a:t>Repository Pattern</a:t>
             </a:r>
           </a:p>
           <a:p>
-            <a:pPr lvl="1">
-              <a:lnSpc>
-                <a:spcPct val="150000"/>
-              </a:lnSpc>
-            </a:pPr>
-            <a:r>
-              <a:rPr lang="en-US" dirty="0"/>
+            <a:pPr lvl="1"/>
+            <a:r>
+              <a:rPr lang="en-US" sz="1800"/>
               <a:t>Encapsulation of database logic</a:t>
             </a:r>
           </a:p>
           <a:p>
-            <a:pPr>
-              <a:lnSpc>
-                <a:spcPct val="150000"/>
-              </a:lnSpc>
-            </a:pPr>
-            <a:r>
-              <a:rPr lang="en-US" dirty="0"/>
+            <a:r>
+              <a:rPr lang="en-US" sz="1800"/>
               <a:t>View Model</a:t>
             </a:r>
           </a:p>
           <a:p>
-            <a:pPr lvl="1">
-              <a:lnSpc>
-                <a:spcPct val="150000"/>
-              </a:lnSpc>
-            </a:pPr>
-            <a:r>
-              <a:rPr lang="en-US" dirty="0"/>
+            <a:pPr lvl="1"/>
+            <a:r>
+              <a:rPr lang="en-US" sz="1800"/>
               <a:t>Separating business logic from the View</a:t>
             </a:r>
           </a:p>
@@ -3720,6 +4692,14 @@
 <file path=ppt/slides/slide4.xml><?xml version="1.0" encoding="utf-8"?>
 <p:sld xmlns:a="http://schemas.openxmlformats.org/drawingml/2006/main" xmlns:r="http://schemas.openxmlformats.org/officeDocument/2006/relationships" xmlns:p="http://schemas.openxmlformats.org/presentationml/2006/main">
   <p:cSld>
+    <p:bg>
+      <p:bgPr>
+        <a:solidFill>
+          <a:schemeClr val="bg1"/>
+        </a:solidFill>
+        <a:effectLst/>
+      </p:bgPr>
+    </p:bg>
     <p:spTree>
       <p:nvGrpSpPr>
         <p:cNvPr id="1" name=""/>
@@ -3734,6 +4714,183 @@
           <a:chExt cx="0" cy="0"/>
         </a:xfrm>
       </p:grpSpPr>
+      <p:pic>
+        <p:nvPicPr>
+          <p:cNvPr id="5" name="Picture 4" descr="A close-up of a plant&#10;&#10;Description automatically generated with medium confidence">
+            <a:extLst>
+              <a:ext uri="{FF2B5EF4-FFF2-40B4-BE49-F238E27FC236}">
+                <a16:creationId xmlns:a16="http://schemas.microsoft.com/office/drawing/2014/main" id="{3AEEFA7B-313D-4979-9976-F15BCDB5BDCC}"/>
+              </a:ext>
+            </a:extLst>
+          </p:cNvPr>
+          <p:cNvPicPr>
+            <a:picLocks noChangeAspect="1"/>
+          </p:cNvPicPr>
+          <p:nvPr/>
+        </p:nvPicPr>
+        <p:blipFill rotWithShape="1">
+          <a:blip r:embed="rId2">
+            <a:extLst>
+              <a:ext uri="{28A0092B-C50C-407E-A947-70E740481C1C}">
+                <a14:useLocalDpi xmlns:a14="http://schemas.microsoft.com/office/drawing/2010/main" val="0"/>
+              </a:ext>
+            </a:extLst>
+          </a:blip>
+          <a:srcRect r="15730"/>
+          <a:stretch/>
+        </p:blipFill>
+        <p:spPr>
+          <a:xfrm rot="16200000">
+            <a:off x="2666999" y="-2667000"/>
+            <a:ext cx="6858000" cy="12192000"/>
+          </a:xfrm>
+          <a:prstGeom prst="rect">
+            <a:avLst/>
+          </a:prstGeom>
+        </p:spPr>
+      </p:pic>
+      <p:sp>
+        <p:nvSpPr>
+          <p:cNvPr id="17" name="Freeform 5">
+            <a:extLst>
+              <a:ext uri="{FF2B5EF4-FFF2-40B4-BE49-F238E27FC236}">
+                <a16:creationId xmlns:a16="http://schemas.microsoft.com/office/drawing/2014/main" id="{3CD9DF72-87A3-404E-A828-84CBF11A8303}"/>
+              </a:ext>
+              <a:ext uri="{C183D7F6-B498-43B3-948B-1728B52AA6E4}">
+                <adec:decorative xmlns:adec="http://schemas.microsoft.com/office/drawing/2017/decorative" val="1"/>
+              </a:ext>
+            </a:extLst>
+          </p:cNvPr>
+          <p:cNvSpPr>
+            <a:spLocks noGrp="1" noRot="1" noChangeAspect="1" noMove="1" noResize="1" noEditPoints="1" noAdjustHandles="1" noChangeArrowheads="1" noChangeShapeType="1" noTextEdit="1"/>
+          </p:cNvSpPr>
+          <p:nvPr>
+            <p:extLst>
+              <p:ext uri="{386F3935-93C4-4BCD-93E2-E3B085C9AB24}">
+                <p16:designElem xmlns:p16="http://schemas.microsoft.com/office/powerpoint/2015/main" val="1"/>
+              </p:ext>
+            </p:extLst>
+          </p:nvPr>
+        </p:nvSpPr>
+        <p:spPr bwMode="grayWhite">
+          <a:xfrm flipH="1">
+            <a:off x="0" y="998175"/>
+            <a:ext cx="6017172" cy="5859825"/>
+          </a:xfrm>
+          <a:custGeom>
+            <a:avLst/>
+            <a:gdLst>
+              <a:gd name="T0" fmla="*/ 1333 w 1333"/>
+              <a:gd name="T1" fmla="*/ 1031 h 1298"/>
+              <a:gd name="T2" fmla="*/ 1333 w 1333"/>
+              <a:gd name="T3" fmla="*/ 380 h 1298"/>
+              <a:gd name="T4" fmla="*/ 706 w 1333"/>
+              <a:gd name="T5" fmla="*/ 0 h 1298"/>
+              <a:gd name="T6" fmla="*/ 0 w 1333"/>
+              <a:gd name="T7" fmla="*/ 706 h 1298"/>
+              <a:gd name="T8" fmla="*/ 323 w 1333"/>
+              <a:gd name="T9" fmla="*/ 1298 h 1298"/>
+              <a:gd name="T10" fmla="*/ 1090 w 1333"/>
+              <a:gd name="T11" fmla="*/ 1298 h 1298"/>
+              <a:gd name="T12" fmla="*/ 1333 w 1333"/>
+              <a:gd name="T13" fmla="*/ 1031 h 1298"/>
+            </a:gdLst>
+            <a:ahLst/>
+            <a:cxnLst>
+              <a:cxn ang="0">
+                <a:pos x="T0" y="T1"/>
+              </a:cxn>
+              <a:cxn ang="0">
+                <a:pos x="T2" y="T3"/>
+              </a:cxn>
+              <a:cxn ang="0">
+                <a:pos x="T4" y="T5"/>
+              </a:cxn>
+              <a:cxn ang="0">
+                <a:pos x="T6" y="T7"/>
+              </a:cxn>
+              <a:cxn ang="0">
+                <a:pos x="T8" y="T9"/>
+              </a:cxn>
+              <a:cxn ang="0">
+                <a:pos x="T10" y="T11"/>
+              </a:cxn>
+              <a:cxn ang="0">
+                <a:pos x="T12" y="T13"/>
+              </a:cxn>
+            </a:cxnLst>
+            <a:rect l="0" t="0" r="r" b="b"/>
+            <a:pathLst>
+              <a:path w="1333" h="1298">
+                <a:moveTo>
+                  <a:pt x="1333" y="1031"/>
+                </a:moveTo>
+                <a:cubicBezTo>
+                  <a:pt x="1333" y="380"/>
+                  <a:pt x="1333" y="380"/>
+                  <a:pt x="1333" y="380"/>
+                </a:cubicBezTo>
+                <a:cubicBezTo>
+                  <a:pt x="1215" y="154"/>
+                  <a:pt x="979" y="0"/>
+                  <a:pt x="706" y="0"/>
+                </a:cubicBezTo>
+                <a:cubicBezTo>
+                  <a:pt x="317" y="0"/>
+                  <a:pt x="0" y="316"/>
+                  <a:pt x="0" y="706"/>
+                </a:cubicBezTo>
+                <a:cubicBezTo>
+                  <a:pt x="0" y="954"/>
+                  <a:pt x="129" y="1172"/>
+                  <a:pt x="323" y="1298"/>
+                </a:cubicBezTo>
+                <a:cubicBezTo>
+                  <a:pt x="1090" y="1298"/>
+                  <a:pt x="1090" y="1298"/>
+                  <a:pt x="1090" y="1298"/>
+                </a:cubicBezTo>
+                <a:cubicBezTo>
+                  <a:pt x="1193" y="1232"/>
+                  <a:pt x="1276" y="1140"/>
+                  <a:pt x="1333" y="1031"/>
+                </a:cubicBezTo>
+                <a:close/>
+              </a:path>
+            </a:pathLst>
+          </a:custGeom>
+          <a:solidFill>
+            <a:schemeClr val="bg1">
+              <a:alpha val="75000"/>
+            </a:schemeClr>
+          </a:solidFill>
+          <a:ln w="50800" cap="sq" cmpd="dbl">
+            <a:noFill/>
+            <a:miter lim="800000"/>
+          </a:ln>
+          <a:effectLst/>
+        </p:spPr>
+        <p:txBody>
+          <a:bodyPr vert="horz" lIns="91440" tIns="45720" rIns="91440" bIns="45720" rtlCol="0" anchor="t">
+            <a:normAutofit/>
+          </a:bodyPr>
+          <a:lstStyle/>
+          <a:p>
+            <a:pPr algn="ctr">
+              <a:spcAft>
+                <a:spcPts val="1000"/>
+              </a:spcAft>
+              <a:buClr>
+                <a:schemeClr val="tx1"/>
+              </a:buClr>
+              <a:buSzPct val="100000"/>
+              <a:buFont typeface="Arial"/>
+              <a:buNone/>
+            </a:pPr>
+            <a:endParaRPr lang="en-US" sz="1600" cap="all"/>
+          </a:p>
+        </p:txBody>
+      </p:sp>
       <p:sp>
         <p:nvSpPr>
           <p:cNvPr id="2" name="Title 1">
@@ -3750,18 +4907,82 @@
             <p:ph type="title"/>
           </p:nvPr>
         </p:nvSpPr>
-        <p:spPr/>
-        <p:txBody>
-          <a:bodyPr/>
-          <a:lstStyle/>
-          <a:p>
-            <a:r>
-              <a:rPr lang="en-US" dirty="0"/>
+        <p:spPr>
+          <a:xfrm>
+            <a:off x="709448" y="1913950"/>
+            <a:ext cx="4204137" cy="1342754"/>
+          </a:xfrm>
+        </p:spPr>
+        <p:txBody>
+          <a:bodyPr>
+            <a:normAutofit/>
+          </a:bodyPr>
+          <a:lstStyle/>
+          <a:p>
+            <a:pPr algn="ctr"/>
+            <a:r>
+              <a:rPr lang="en-US" sz="3600"/>
               <a:t>Libraries</a:t>
             </a:r>
           </a:p>
         </p:txBody>
       </p:sp>
+      <p:cxnSp>
+        <p:nvCxnSpPr>
+          <p:cNvPr id="19" name="Straight Connector 18">
+            <a:extLst>
+              <a:ext uri="{FF2B5EF4-FFF2-40B4-BE49-F238E27FC236}">
+                <a16:creationId xmlns:a16="http://schemas.microsoft.com/office/drawing/2014/main" id="{20E3A342-4D61-4E3F-AF90-1AB42AEB96CC}"/>
+              </a:ext>
+              <a:ext uri="{C183D7F6-B498-43B3-948B-1728B52AA6E4}">
+                <adec:decorative xmlns:adec="http://schemas.microsoft.com/office/drawing/2017/decorative" val="1"/>
+              </a:ext>
+            </a:extLst>
+          </p:cNvPr>
+          <p:cNvCxnSpPr>
+            <a:cxnSpLocks noGrp="1" noRot="1" noChangeAspect="1" noMove="1" noResize="1" noEditPoints="1" noAdjustHandles="1" noChangeArrowheads="1" noChangeShapeType="1"/>
+          </p:cNvCxnSpPr>
+          <p:nvPr>
+            <p:extLst>
+              <p:ext uri="{386F3935-93C4-4BCD-93E2-E3B085C9AB24}">
+                <p16:designElem xmlns:p16="http://schemas.microsoft.com/office/powerpoint/2015/main" val="1"/>
+              </p:ext>
+            </p:extLst>
+          </p:nvPr>
+        </p:nvCxnSpPr>
+        <p:spPr>
+          <a:xfrm>
+            <a:off x="2287051" y="3337139"/>
+            <a:ext cx="935420" cy="0"/>
+          </a:xfrm>
+          <a:prstGeom prst="line">
+            <a:avLst/>
+          </a:prstGeom>
+          <a:ln w="25400" cap="sq">
+            <a:solidFill>
+              <a:schemeClr val="tx1">
+                <a:lumMod val="85000"/>
+                <a:lumOff val="15000"/>
+              </a:schemeClr>
+            </a:solidFill>
+            <a:bevel/>
+          </a:ln>
+        </p:spPr>
+        <p:style>
+          <a:lnRef idx="1">
+            <a:schemeClr val="accent1"/>
+          </a:lnRef>
+          <a:fillRef idx="0">
+            <a:schemeClr val="accent1"/>
+          </a:fillRef>
+          <a:effectRef idx="0">
+            <a:schemeClr val="accent1"/>
+          </a:effectRef>
+          <a:fontRef idx="minor">
+            <a:schemeClr val="tx1"/>
+          </a:fontRef>
+        </p:style>
+      </p:cxnSp>
       <p:sp>
         <p:nvSpPr>
           <p:cNvPr id="3" name="Content Placeholder 2">
@@ -3778,83 +4999,58 @@
             <p:ph idx="1"/>
           </p:nvPr>
         </p:nvSpPr>
-        <p:spPr/>
-        <p:txBody>
-          <a:bodyPr/>
-          <a:lstStyle/>
-          <a:p>
-            <a:pPr>
-              <a:lnSpc>
-                <a:spcPct val="150000"/>
-              </a:lnSpc>
-            </a:pPr>
-            <a:r>
-              <a:rPr lang="en-US" dirty="0"/>
+        <p:spPr>
+          <a:xfrm>
+            <a:off x="525516" y="3417573"/>
+            <a:ext cx="4593021" cy="2619839"/>
+          </a:xfrm>
+        </p:spPr>
+        <p:txBody>
+          <a:bodyPr anchor="ctr">
+            <a:normAutofit/>
+          </a:bodyPr>
+          <a:lstStyle/>
+          <a:p>
+            <a:r>
+              <a:rPr lang="en-US" sz="1800"/>
               <a:t>Firebase</a:t>
             </a:r>
           </a:p>
           <a:p>
-            <a:pPr lvl="1">
-              <a:lnSpc>
-                <a:spcPct val="150000"/>
-              </a:lnSpc>
-            </a:pPr>
-            <a:r>
-              <a:rPr lang="en-US" dirty="0"/>
+            <a:pPr lvl="1"/>
+            <a:r>
+              <a:rPr lang="en-US" sz="1800"/>
               <a:t>Authentication, Realtime Database, Storage (images), Functions</a:t>
             </a:r>
           </a:p>
           <a:p>
-            <a:pPr>
-              <a:lnSpc>
-                <a:spcPct val="150000"/>
-              </a:lnSpc>
-            </a:pPr>
-            <a:r>
-              <a:rPr lang="en-US" dirty="0"/>
+            <a:r>
+              <a:rPr lang="en-US" sz="1800"/>
               <a:t>Glide</a:t>
             </a:r>
           </a:p>
           <a:p>
-            <a:pPr lvl="1">
-              <a:lnSpc>
-                <a:spcPct val="150000"/>
-              </a:lnSpc>
-            </a:pPr>
-            <a:r>
-              <a:rPr lang="en-US" dirty="0"/>
+            <a:pPr lvl="1"/>
+            <a:r>
+              <a:rPr lang="en-US" sz="1800"/>
               <a:t>Image loading optimization</a:t>
             </a:r>
           </a:p>
           <a:p>
-            <a:pPr>
-              <a:lnSpc>
-                <a:spcPct val="150000"/>
-              </a:lnSpc>
-            </a:pPr>
-            <a:r>
-              <a:rPr lang="en-US" dirty="0"/>
+            <a:r>
+              <a:rPr lang="en-US" sz="1800"/>
               <a:t>Google Maps API</a:t>
             </a:r>
           </a:p>
           <a:p>
-            <a:pPr lvl="1">
-              <a:lnSpc>
-                <a:spcPct val="150000"/>
-              </a:lnSpc>
-            </a:pPr>
-            <a:r>
-              <a:rPr lang="en-US" dirty="0"/>
+            <a:pPr lvl="1"/>
+            <a:r>
+              <a:rPr lang="en-US" sz="1800"/>
               <a:t>Markers, Location</a:t>
             </a:r>
           </a:p>
           <a:p>
-            <a:pPr>
-              <a:lnSpc>
-                <a:spcPct val="150000"/>
-              </a:lnSpc>
-            </a:pPr>
-            <a:endParaRPr lang="en-US" dirty="0"/>
+            <a:endParaRPr lang="en-US" sz="1800"/>
           </a:p>
         </p:txBody>
       </p:sp>
@@ -3874,6 +5070,14 @@
 <file path=ppt/slides/slide5.xml><?xml version="1.0" encoding="utf-8"?>
 <p:sld xmlns:a="http://schemas.openxmlformats.org/drawingml/2006/main" xmlns:r="http://schemas.openxmlformats.org/officeDocument/2006/relationships" xmlns:p="http://schemas.openxmlformats.org/presentationml/2006/main">
   <p:cSld>
+    <p:bg>
+      <p:bgPr>
+        <a:solidFill>
+          <a:schemeClr val="bg1"/>
+        </a:solidFill>
+        <a:effectLst/>
+      </p:bgPr>
+    </p:bg>
     <p:spTree>
       <p:nvGrpSpPr>
         <p:cNvPr id="1" name=""/>
@@ -3888,6 +5092,183 @@
           <a:chExt cx="0" cy="0"/>
         </a:xfrm>
       </p:grpSpPr>
+      <p:pic>
+        <p:nvPicPr>
+          <p:cNvPr id="7" name="Picture 6" descr="A plant with leaves&#10;&#10;Description automatically generated with low confidence">
+            <a:extLst>
+              <a:ext uri="{FF2B5EF4-FFF2-40B4-BE49-F238E27FC236}">
+                <a16:creationId xmlns:a16="http://schemas.microsoft.com/office/drawing/2014/main" id="{F4B39E0E-12FF-4B00-8AF6-F47DCD5DF27E}"/>
+              </a:ext>
+            </a:extLst>
+          </p:cNvPr>
+          <p:cNvPicPr>
+            <a:picLocks noChangeAspect="1"/>
+          </p:cNvPicPr>
+          <p:nvPr/>
+        </p:nvPicPr>
+        <p:blipFill rotWithShape="1">
+          <a:blip r:embed="rId2">
+            <a:extLst>
+              <a:ext uri="{28A0092B-C50C-407E-A947-70E740481C1C}">
+                <a14:useLocalDpi xmlns:a14="http://schemas.microsoft.com/office/drawing/2010/main" val="0"/>
+              </a:ext>
+            </a:extLst>
+          </a:blip>
+          <a:srcRect l="15730"/>
+          <a:stretch/>
+        </p:blipFill>
+        <p:spPr>
+          <a:xfrm rot="5400000">
+            <a:off x="2666999" y="-2667000"/>
+            <a:ext cx="6858000" cy="12192000"/>
+          </a:xfrm>
+          <a:prstGeom prst="rect">
+            <a:avLst/>
+          </a:prstGeom>
+        </p:spPr>
+      </p:pic>
+      <p:sp>
+        <p:nvSpPr>
+          <p:cNvPr id="17" name="Freeform 5">
+            <a:extLst>
+              <a:ext uri="{FF2B5EF4-FFF2-40B4-BE49-F238E27FC236}">
+                <a16:creationId xmlns:a16="http://schemas.microsoft.com/office/drawing/2014/main" id="{3CD9DF72-87A3-404E-A828-84CBF11A8303}"/>
+              </a:ext>
+              <a:ext uri="{C183D7F6-B498-43B3-948B-1728B52AA6E4}">
+                <adec:decorative xmlns:adec="http://schemas.microsoft.com/office/drawing/2017/decorative" val="1"/>
+              </a:ext>
+            </a:extLst>
+          </p:cNvPr>
+          <p:cNvSpPr>
+            <a:spLocks noGrp="1" noRot="1" noChangeAspect="1" noMove="1" noResize="1" noEditPoints="1" noAdjustHandles="1" noChangeArrowheads="1" noChangeShapeType="1" noTextEdit="1"/>
+          </p:cNvSpPr>
+          <p:nvPr>
+            <p:extLst>
+              <p:ext uri="{386F3935-93C4-4BCD-93E2-E3B085C9AB24}">
+                <p16:designElem xmlns:p16="http://schemas.microsoft.com/office/powerpoint/2015/main" val="1"/>
+              </p:ext>
+            </p:extLst>
+          </p:nvPr>
+        </p:nvSpPr>
+        <p:spPr bwMode="grayWhite">
+          <a:xfrm flipH="1">
+            <a:off x="0" y="998175"/>
+            <a:ext cx="6017172" cy="5859825"/>
+          </a:xfrm>
+          <a:custGeom>
+            <a:avLst/>
+            <a:gdLst>
+              <a:gd name="T0" fmla="*/ 1333 w 1333"/>
+              <a:gd name="T1" fmla="*/ 1031 h 1298"/>
+              <a:gd name="T2" fmla="*/ 1333 w 1333"/>
+              <a:gd name="T3" fmla="*/ 380 h 1298"/>
+              <a:gd name="T4" fmla="*/ 706 w 1333"/>
+              <a:gd name="T5" fmla="*/ 0 h 1298"/>
+              <a:gd name="T6" fmla="*/ 0 w 1333"/>
+              <a:gd name="T7" fmla="*/ 706 h 1298"/>
+              <a:gd name="T8" fmla="*/ 323 w 1333"/>
+              <a:gd name="T9" fmla="*/ 1298 h 1298"/>
+              <a:gd name="T10" fmla="*/ 1090 w 1333"/>
+              <a:gd name="T11" fmla="*/ 1298 h 1298"/>
+              <a:gd name="T12" fmla="*/ 1333 w 1333"/>
+              <a:gd name="T13" fmla="*/ 1031 h 1298"/>
+            </a:gdLst>
+            <a:ahLst/>
+            <a:cxnLst>
+              <a:cxn ang="0">
+                <a:pos x="T0" y="T1"/>
+              </a:cxn>
+              <a:cxn ang="0">
+                <a:pos x="T2" y="T3"/>
+              </a:cxn>
+              <a:cxn ang="0">
+                <a:pos x="T4" y="T5"/>
+              </a:cxn>
+              <a:cxn ang="0">
+                <a:pos x="T6" y="T7"/>
+              </a:cxn>
+              <a:cxn ang="0">
+                <a:pos x="T8" y="T9"/>
+              </a:cxn>
+              <a:cxn ang="0">
+                <a:pos x="T10" y="T11"/>
+              </a:cxn>
+              <a:cxn ang="0">
+                <a:pos x="T12" y="T13"/>
+              </a:cxn>
+            </a:cxnLst>
+            <a:rect l="0" t="0" r="r" b="b"/>
+            <a:pathLst>
+              <a:path w="1333" h="1298">
+                <a:moveTo>
+                  <a:pt x="1333" y="1031"/>
+                </a:moveTo>
+                <a:cubicBezTo>
+                  <a:pt x="1333" y="380"/>
+                  <a:pt x="1333" y="380"/>
+                  <a:pt x="1333" y="380"/>
+                </a:cubicBezTo>
+                <a:cubicBezTo>
+                  <a:pt x="1215" y="154"/>
+                  <a:pt x="979" y="0"/>
+                  <a:pt x="706" y="0"/>
+                </a:cubicBezTo>
+                <a:cubicBezTo>
+                  <a:pt x="317" y="0"/>
+                  <a:pt x="0" y="316"/>
+                  <a:pt x="0" y="706"/>
+                </a:cubicBezTo>
+                <a:cubicBezTo>
+                  <a:pt x="0" y="954"/>
+                  <a:pt x="129" y="1172"/>
+                  <a:pt x="323" y="1298"/>
+                </a:cubicBezTo>
+                <a:cubicBezTo>
+                  <a:pt x="1090" y="1298"/>
+                  <a:pt x="1090" y="1298"/>
+                  <a:pt x="1090" y="1298"/>
+                </a:cubicBezTo>
+                <a:cubicBezTo>
+                  <a:pt x="1193" y="1232"/>
+                  <a:pt x="1276" y="1140"/>
+                  <a:pt x="1333" y="1031"/>
+                </a:cubicBezTo>
+                <a:close/>
+              </a:path>
+            </a:pathLst>
+          </a:custGeom>
+          <a:solidFill>
+            <a:schemeClr val="bg1">
+              <a:alpha val="75000"/>
+            </a:schemeClr>
+          </a:solidFill>
+          <a:ln w="50800" cap="sq" cmpd="dbl">
+            <a:noFill/>
+            <a:miter lim="800000"/>
+          </a:ln>
+          <a:effectLst/>
+        </p:spPr>
+        <p:txBody>
+          <a:bodyPr vert="horz" lIns="91440" tIns="45720" rIns="91440" bIns="45720" rtlCol="0" anchor="t">
+            <a:normAutofit/>
+          </a:bodyPr>
+          <a:lstStyle/>
+          <a:p>
+            <a:pPr algn="ctr">
+              <a:spcAft>
+                <a:spcPts val="1000"/>
+              </a:spcAft>
+              <a:buClr>
+                <a:schemeClr val="tx1"/>
+              </a:buClr>
+              <a:buSzPct val="100000"/>
+              <a:buFont typeface="Arial"/>
+              <a:buNone/>
+            </a:pPr>
+            <a:endParaRPr lang="en-US" sz="1600" cap="all"/>
+          </a:p>
+        </p:txBody>
+      </p:sp>
       <p:sp>
         <p:nvSpPr>
           <p:cNvPr id="2" name="Title 1">
@@ -3904,18 +5285,82 @@
             <p:ph type="title"/>
           </p:nvPr>
         </p:nvSpPr>
-        <p:spPr/>
-        <p:txBody>
-          <a:bodyPr/>
-          <a:lstStyle/>
-          <a:p>
-            <a:r>
-              <a:rPr lang="en-US" dirty="0"/>
+        <p:spPr>
+          <a:xfrm>
+            <a:off x="709448" y="1913950"/>
+            <a:ext cx="4204137" cy="1342754"/>
+          </a:xfrm>
+        </p:spPr>
+        <p:txBody>
+          <a:bodyPr>
+            <a:normAutofit/>
+          </a:bodyPr>
+          <a:lstStyle/>
+          <a:p>
+            <a:pPr algn="ctr"/>
+            <a:r>
+              <a:rPr lang="en-US" sz="3600"/>
               <a:t>Difficulties</a:t>
             </a:r>
           </a:p>
         </p:txBody>
       </p:sp>
+      <p:cxnSp>
+        <p:nvCxnSpPr>
+          <p:cNvPr id="19" name="Straight Connector 18">
+            <a:extLst>
+              <a:ext uri="{FF2B5EF4-FFF2-40B4-BE49-F238E27FC236}">
+                <a16:creationId xmlns:a16="http://schemas.microsoft.com/office/drawing/2014/main" id="{20E3A342-4D61-4E3F-AF90-1AB42AEB96CC}"/>
+              </a:ext>
+              <a:ext uri="{C183D7F6-B498-43B3-948B-1728B52AA6E4}">
+                <adec:decorative xmlns:adec="http://schemas.microsoft.com/office/drawing/2017/decorative" val="1"/>
+              </a:ext>
+            </a:extLst>
+          </p:cNvPr>
+          <p:cNvCxnSpPr>
+            <a:cxnSpLocks noGrp="1" noRot="1" noChangeAspect="1" noMove="1" noResize="1" noEditPoints="1" noAdjustHandles="1" noChangeArrowheads="1" noChangeShapeType="1"/>
+          </p:cNvCxnSpPr>
+          <p:nvPr>
+            <p:extLst>
+              <p:ext uri="{386F3935-93C4-4BCD-93E2-E3B085C9AB24}">
+                <p16:designElem xmlns:p16="http://schemas.microsoft.com/office/powerpoint/2015/main" val="1"/>
+              </p:ext>
+            </p:extLst>
+          </p:nvPr>
+        </p:nvCxnSpPr>
+        <p:spPr>
+          <a:xfrm>
+            <a:off x="2287051" y="3337139"/>
+            <a:ext cx="935420" cy="0"/>
+          </a:xfrm>
+          <a:prstGeom prst="line">
+            <a:avLst/>
+          </a:prstGeom>
+          <a:ln w="25400" cap="sq">
+            <a:solidFill>
+              <a:schemeClr val="tx1">
+                <a:lumMod val="85000"/>
+                <a:lumOff val="15000"/>
+              </a:schemeClr>
+            </a:solidFill>
+            <a:bevel/>
+          </a:ln>
+        </p:spPr>
+        <p:style>
+          <a:lnRef idx="1">
+            <a:schemeClr val="accent1"/>
+          </a:lnRef>
+          <a:fillRef idx="0">
+            <a:schemeClr val="accent1"/>
+          </a:fillRef>
+          <a:effectRef idx="0">
+            <a:schemeClr val="accent1"/>
+          </a:effectRef>
+          <a:fontRef idx="minor">
+            <a:schemeClr val="tx1"/>
+          </a:fontRef>
+        </p:style>
+      </p:cxnSp>
       <p:sp>
         <p:nvSpPr>
           <p:cNvPr id="3" name="Content Placeholder 2">
@@ -3932,86 +5377,58 @@
             <p:ph idx="1"/>
           </p:nvPr>
         </p:nvSpPr>
-        <p:spPr/>
-        <p:txBody>
-          <a:bodyPr>
-            <a:normAutofit fontScale="92500" lnSpcReduction="20000"/>
+        <p:spPr>
+          <a:xfrm>
+            <a:off x="525516" y="3417573"/>
+            <a:ext cx="4593021" cy="2619839"/>
+          </a:xfrm>
+        </p:spPr>
+        <p:txBody>
+          <a:bodyPr anchor="ctr">
+            <a:normAutofit/>
           </a:bodyPr>
           <a:lstStyle/>
           <a:p>
-            <a:pPr>
-              <a:lnSpc>
-                <a:spcPct val="150000"/>
-              </a:lnSpc>
-            </a:pPr>
-            <a:r>
-              <a:rPr lang="en-US" dirty="0"/>
+            <a:r>
+              <a:rPr lang="en-US" sz="1700"/>
               <a:t>Synchronizing multiple calls to my database</a:t>
             </a:r>
           </a:p>
           <a:p>
-            <a:pPr lvl="1">
-              <a:lnSpc>
-                <a:spcPct val="150000"/>
-              </a:lnSpc>
-            </a:pPr>
-            <a:r>
-              <a:rPr lang="en-US" dirty="0"/>
+            <a:pPr lvl="1"/>
+            <a:r>
+              <a:rPr lang="en-US" sz="1700"/>
               <a:t>Some are dependent on the previous calls</a:t>
             </a:r>
           </a:p>
           <a:p>
-            <a:pPr>
-              <a:lnSpc>
-                <a:spcPct val="150000"/>
-              </a:lnSpc>
-            </a:pPr>
-            <a:r>
-              <a:rPr lang="en-US" dirty="0"/>
+            <a:r>
+              <a:rPr lang="en-US" sz="1700"/>
               <a:t>Storing photos and loading them</a:t>
             </a:r>
           </a:p>
           <a:p>
-            <a:pPr>
-              <a:lnSpc>
-                <a:spcPct val="150000"/>
-              </a:lnSpc>
-            </a:pPr>
-            <a:r>
-              <a:rPr lang="en-US" dirty="0"/>
+            <a:r>
+              <a:rPr lang="en-US" sz="1700"/>
               <a:t>UI</a:t>
             </a:r>
           </a:p>
           <a:p>
-            <a:pPr lvl="1">
-              <a:lnSpc>
-                <a:spcPct val="150000"/>
-              </a:lnSpc>
-            </a:pPr>
-            <a:r>
-              <a:rPr lang="en-US" dirty="0"/>
+            <a:pPr lvl="1"/>
+            <a:r>
+              <a:rPr lang="en-US" sz="1700"/>
               <a:t>XML vs Jetpack Compose</a:t>
             </a:r>
           </a:p>
           <a:p>
-            <a:pPr>
-              <a:lnSpc>
-                <a:spcPct val="150000"/>
-              </a:lnSpc>
-            </a:pPr>
-            <a:r>
-              <a:rPr lang="en-US" dirty="0"/>
+            <a:r>
+              <a:rPr lang="en-US" sz="1700"/>
               <a:t>Android &amp; Kotlin</a:t>
             </a:r>
           </a:p>
           <a:p>
-            <a:pPr>
-              <a:lnSpc>
-                <a:spcPct val="150000"/>
-              </a:lnSpc>
-            </a:pPr>
-            <a:r>
-              <a:rPr lang="en-US" dirty="0"/>
+            <a:r>
+              <a:rPr lang="en-US" sz="1700"/>
               <a:t>Scope of project</a:t>
             </a:r>
           </a:p>
@@ -4033,6 +5450,14 @@
 <file path=ppt/slides/slide6.xml><?xml version="1.0" encoding="utf-8"?>
 <p:sld xmlns:a="http://schemas.openxmlformats.org/drawingml/2006/main" xmlns:r="http://schemas.openxmlformats.org/officeDocument/2006/relationships" xmlns:p="http://schemas.openxmlformats.org/presentationml/2006/main">
   <p:cSld>
+    <p:bg>
+      <p:bgPr>
+        <a:solidFill>
+          <a:schemeClr val="bg1"/>
+        </a:solidFill>
+        <a:effectLst/>
+      </p:bgPr>
+    </p:bg>
     <p:spTree>
       <p:nvGrpSpPr>
         <p:cNvPr id="1" name=""/>
@@ -4047,6 +5472,183 @@
           <a:chExt cx="0" cy="0"/>
         </a:xfrm>
       </p:grpSpPr>
+      <p:pic>
+        <p:nvPicPr>
+          <p:cNvPr id="5" name="Picture 4" descr="A close-up of a plant&#10;&#10;Description automatically generated with medium confidence">
+            <a:extLst>
+              <a:ext uri="{FF2B5EF4-FFF2-40B4-BE49-F238E27FC236}">
+                <a16:creationId xmlns:a16="http://schemas.microsoft.com/office/drawing/2014/main" id="{0EF59CA2-0F01-45FA-874C-10FF8C360CDB}"/>
+              </a:ext>
+            </a:extLst>
+          </p:cNvPr>
+          <p:cNvPicPr>
+            <a:picLocks noChangeAspect="1"/>
+          </p:cNvPicPr>
+          <p:nvPr/>
+        </p:nvPicPr>
+        <p:blipFill rotWithShape="1">
+          <a:blip r:embed="rId2">
+            <a:extLst>
+              <a:ext uri="{28A0092B-C50C-407E-A947-70E740481C1C}">
+                <a14:useLocalDpi xmlns:a14="http://schemas.microsoft.com/office/drawing/2010/main" val="0"/>
+              </a:ext>
+            </a:extLst>
+          </a:blip>
+          <a:srcRect r="15730"/>
+          <a:stretch/>
+        </p:blipFill>
+        <p:spPr>
+          <a:xfrm rot="16200000">
+            <a:off x="2666999" y="-2667000"/>
+            <a:ext cx="6858000" cy="12192000"/>
+          </a:xfrm>
+          <a:prstGeom prst="rect">
+            <a:avLst/>
+          </a:prstGeom>
+        </p:spPr>
+      </p:pic>
+      <p:sp>
+        <p:nvSpPr>
+          <p:cNvPr id="10" name="Freeform 5">
+            <a:extLst>
+              <a:ext uri="{FF2B5EF4-FFF2-40B4-BE49-F238E27FC236}">
+                <a16:creationId xmlns:a16="http://schemas.microsoft.com/office/drawing/2014/main" id="{3CD9DF72-87A3-404E-A828-84CBF11A8303}"/>
+              </a:ext>
+              <a:ext uri="{C183D7F6-B498-43B3-948B-1728B52AA6E4}">
+                <adec:decorative xmlns:adec="http://schemas.microsoft.com/office/drawing/2017/decorative" val="1"/>
+              </a:ext>
+            </a:extLst>
+          </p:cNvPr>
+          <p:cNvSpPr>
+            <a:spLocks noGrp="1" noRot="1" noChangeAspect="1" noMove="1" noResize="1" noEditPoints="1" noAdjustHandles="1" noChangeArrowheads="1" noChangeShapeType="1" noTextEdit="1"/>
+          </p:cNvSpPr>
+          <p:nvPr>
+            <p:extLst>
+              <p:ext uri="{386F3935-93C4-4BCD-93E2-E3B085C9AB24}">
+                <p16:designElem xmlns:p16="http://schemas.microsoft.com/office/powerpoint/2015/main" val="1"/>
+              </p:ext>
+            </p:extLst>
+          </p:nvPr>
+        </p:nvSpPr>
+        <p:spPr bwMode="grayWhite">
+          <a:xfrm flipH="1">
+            <a:off x="0" y="998175"/>
+            <a:ext cx="6017172" cy="5859825"/>
+          </a:xfrm>
+          <a:custGeom>
+            <a:avLst/>
+            <a:gdLst>
+              <a:gd name="T0" fmla="*/ 1333 w 1333"/>
+              <a:gd name="T1" fmla="*/ 1031 h 1298"/>
+              <a:gd name="T2" fmla="*/ 1333 w 1333"/>
+              <a:gd name="T3" fmla="*/ 380 h 1298"/>
+              <a:gd name="T4" fmla="*/ 706 w 1333"/>
+              <a:gd name="T5" fmla="*/ 0 h 1298"/>
+              <a:gd name="T6" fmla="*/ 0 w 1333"/>
+              <a:gd name="T7" fmla="*/ 706 h 1298"/>
+              <a:gd name="T8" fmla="*/ 323 w 1333"/>
+              <a:gd name="T9" fmla="*/ 1298 h 1298"/>
+              <a:gd name="T10" fmla="*/ 1090 w 1333"/>
+              <a:gd name="T11" fmla="*/ 1298 h 1298"/>
+              <a:gd name="T12" fmla="*/ 1333 w 1333"/>
+              <a:gd name="T13" fmla="*/ 1031 h 1298"/>
+            </a:gdLst>
+            <a:ahLst/>
+            <a:cxnLst>
+              <a:cxn ang="0">
+                <a:pos x="T0" y="T1"/>
+              </a:cxn>
+              <a:cxn ang="0">
+                <a:pos x="T2" y="T3"/>
+              </a:cxn>
+              <a:cxn ang="0">
+                <a:pos x="T4" y="T5"/>
+              </a:cxn>
+              <a:cxn ang="0">
+                <a:pos x="T6" y="T7"/>
+              </a:cxn>
+              <a:cxn ang="0">
+                <a:pos x="T8" y="T9"/>
+              </a:cxn>
+              <a:cxn ang="0">
+                <a:pos x="T10" y="T11"/>
+              </a:cxn>
+              <a:cxn ang="0">
+                <a:pos x="T12" y="T13"/>
+              </a:cxn>
+            </a:cxnLst>
+            <a:rect l="0" t="0" r="r" b="b"/>
+            <a:pathLst>
+              <a:path w="1333" h="1298">
+                <a:moveTo>
+                  <a:pt x="1333" y="1031"/>
+                </a:moveTo>
+                <a:cubicBezTo>
+                  <a:pt x="1333" y="380"/>
+                  <a:pt x="1333" y="380"/>
+                  <a:pt x="1333" y="380"/>
+                </a:cubicBezTo>
+                <a:cubicBezTo>
+                  <a:pt x="1215" y="154"/>
+                  <a:pt x="979" y="0"/>
+                  <a:pt x="706" y="0"/>
+                </a:cubicBezTo>
+                <a:cubicBezTo>
+                  <a:pt x="317" y="0"/>
+                  <a:pt x="0" y="316"/>
+                  <a:pt x="0" y="706"/>
+                </a:cubicBezTo>
+                <a:cubicBezTo>
+                  <a:pt x="0" y="954"/>
+                  <a:pt x="129" y="1172"/>
+                  <a:pt x="323" y="1298"/>
+                </a:cubicBezTo>
+                <a:cubicBezTo>
+                  <a:pt x="1090" y="1298"/>
+                  <a:pt x="1090" y="1298"/>
+                  <a:pt x="1090" y="1298"/>
+                </a:cubicBezTo>
+                <a:cubicBezTo>
+                  <a:pt x="1193" y="1232"/>
+                  <a:pt x="1276" y="1140"/>
+                  <a:pt x="1333" y="1031"/>
+                </a:cubicBezTo>
+                <a:close/>
+              </a:path>
+            </a:pathLst>
+          </a:custGeom>
+          <a:solidFill>
+            <a:schemeClr val="bg1">
+              <a:alpha val="75000"/>
+            </a:schemeClr>
+          </a:solidFill>
+          <a:ln w="50800" cap="sq" cmpd="dbl">
+            <a:noFill/>
+            <a:miter lim="800000"/>
+          </a:ln>
+          <a:effectLst/>
+        </p:spPr>
+        <p:txBody>
+          <a:bodyPr vert="horz" lIns="91440" tIns="45720" rIns="91440" bIns="45720" rtlCol="0" anchor="t">
+            <a:normAutofit/>
+          </a:bodyPr>
+          <a:lstStyle/>
+          <a:p>
+            <a:pPr algn="ctr">
+              <a:spcAft>
+                <a:spcPts val="1000"/>
+              </a:spcAft>
+              <a:buClr>
+                <a:schemeClr val="tx1"/>
+              </a:buClr>
+              <a:buSzPct val="100000"/>
+              <a:buFont typeface="Arial"/>
+              <a:buNone/>
+            </a:pPr>
+            <a:endParaRPr lang="en-US" sz="1600" cap="all"/>
+          </a:p>
+        </p:txBody>
+      </p:sp>
       <p:sp>
         <p:nvSpPr>
           <p:cNvPr id="2" name="Title 1">
@@ -4063,18 +5665,82 @@
             <p:ph type="title"/>
           </p:nvPr>
         </p:nvSpPr>
-        <p:spPr/>
-        <p:txBody>
-          <a:bodyPr/>
-          <a:lstStyle/>
-          <a:p>
-            <a:r>
-              <a:rPr lang="en-US" dirty="0"/>
+        <p:spPr>
+          <a:xfrm>
+            <a:off x="709448" y="1913950"/>
+            <a:ext cx="4204137" cy="1342754"/>
+          </a:xfrm>
+        </p:spPr>
+        <p:txBody>
+          <a:bodyPr>
+            <a:normAutofit/>
+          </a:bodyPr>
+          <a:lstStyle/>
+          <a:p>
+            <a:pPr algn="ctr"/>
+            <a:r>
+              <a:rPr lang="en-US" sz="3600"/>
               <a:t>Wants and dreams</a:t>
             </a:r>
           </a:p>
         </p:txBody>
       </p:sp>
+      <p:cxnSp>
+        <p:nvCxnSpPr>
+          <p:cNvPr id="12" name="Straight Connector 11">
+            <a:extLst>
+              <a:ext uri="{FF2B5EF4-FFF2-40B4-BE49-F238E27FC236}">
+                <a16:creationId xmlns:a16="http://schemas.microsoft.com/office/drawing/2014/main" id="{20E3A342-4D61-4E3F-AF90-1AB42AEB96CC}"/>
+              </a:ext>
+              <a:ext uri="{C183D7F6-B498-43B3-948B-1728B52AA6E4}">
+                <adec:decorative xmlns:adec="http://schemas.microsoft.com/office/drawing/2017/decorative" val="1"/>
+              </a:ext>
+            </a:extLst>
+          </p:cNvPr>
+          <p:cNvCxnSpPr>
+            <a:cxnSpLocks noGrp="1" noRot="1" noChangeAspect="1" noMove="1" noResize="1" noEditPoints="1" noAdjustHandles="1" noChangeArrowheads="1" noChangeShapeType="1"/>
+          </p:cNvCxnSpPr>
+          <p:nvPr>
+            <p:extLst>
+              <p:ext uri="{386F3935-93C4-4BCD-93E2-E3B085C9AB24}">
+                <p16:designElem xmlns:p16="http://schemas.microsoft.com/office/powerpoint/2015/main" val="1"/>
+              </p:ext>
+            </p:extLst>
+          </p:nvPr>
+        </p:nvCxnSpPr>
+        <p:spPr>
+          <a:xfrm>
+            <a:off x="2287051" y="3337139"/>
+            <a:ext cx="935420" cy="0"/>
+          </a:xfrm>
+          <a:prstGeom prst="line">
+            <a:avLst/>
+          </a:prstGeom>
+          <a:ln w="25400" cap="sq">
+            <a:solidFill>
+              <a:schemeClr val="tx1">
+                <a:lumMod val="85000"/>
+                <a:lumOff val="15000"/>
+              </a:schemeClr>
+            </a:solidFill>
+            <a:bevel/>
+          </a:ln>
+        </p:spPr>
+        <p:style>
+          <a:lnRef idx="1">
+            <a:schemeClr val="accent1"/>
+          </a:lnRef>
+          <a:fillRef idx="0">
+            <a:schemeClr val="accent1"/>
+          </a:fillRef>
+          <a:effectRef idx="0">
+            <a:schemeClr val="accent1"/>
+          </a:effectRef>
+          <a:fontRef idx="minor">
+            <a:schemeClr val="tx1"/>
+          </a:fontRef>
+        </p:style>
+      </p:cxnSp>
       <p:sp>
         <p:nvSpPr>
           <p:cNvPr id="3" name="Content Placeholder 2">
@@ -4091,73 +5757,53 @@
             <p:ph idx="1"/>
           </p:nvPr>
         </p:nvSpPr>
-        <p:spPr/>
-        <p:txBody>
-          <a:bodyPr/>
-          <a:lstStyle/>
-          <a:p>
-            <a:pPr>
-              <a:lnSpc>
-                <a:spcPct val="150000"/>
-              </a:lnSpc>
-            </a:pPr>
-            <a:r>
-              <a:rPr lang="en-US" dirty="0"/>
+        <p:spPr>
+          <a:xfrm>
+            <a:off x="525516" y="3417573"/>
+            <a:ext cx="4593021" cy="2619839"/>
+          </a:xfrm>
+        </p:spPr>
+        <p:txBody>
+          <a:bodyPr anchor="ctr">
+            <a:normAutofit/>
+          </a:bodyPr>
+          <a:lstStyle/>
+          <a:p>
+            <a:r>
+              <a:rPr lang="en-US" sz="1800"/>
               <a:t>Using compose over XML</a:t>
             </a:r>
           </a:p>
           <a:p>
-            <a:pPr>
-              <a:lnSpc>
-                <a:spcPct val="150000"/>
-              </a:lnSpc>
-            </a:pPr>
-            <a:r>
-              <a:rPr lang="en-US" dirty="0"/>
+            <a:r>
+              <a:rPr lang="en-US" sz="1800"/>
               <a:t>Groups feature</a:t>
             </a:r>
           </a:p>
           <a:p>
-            <a:pPr lvl="1">
-              <a:lnSpc>
-                <a:spcPct val="150000"/>
-              </a:lnSpc>
-            </a:pPr>
-            <a:r>
-              <a:rPr lang="en-US" dirty="0"/>
+            <a:pPr lvl="1"/>
+            <a:r>
+              <a:rPr lang="en-US" sz="1800"/>
               <a:t>Networking features, sharing plants with friends etc.</a:t>
             </a:r>
           </a:p>
           <a:p>
-            <a:pPr>
-              <a:lnSpc>
-                <a:spcPct val="150000"/>
-              </a:lnSpc>
-            </a:pPr>
-            <a:r>
-              <a:rPr lang="en-US" dirty="0"/>
+            <a:r>
+              <a:rPr lang="en-US" sz="1800"/>
               <a:t>Retrofit</a:t>
             </a:r>
           </a:p>
           <a:p>
-            <a:pPr lvl="1">
-              <a:lnSpc>
-                <a:spcPct val="150000"/>
-              </a:lnSpc>
-            </a:pPr>
-            <a:r>
-              <a:rPr lang="en-US" dirty="0"/>
+            <a:pPr lvl="1"/>
+            <a:r>
+              <a:rPr lang="en-US" sz="1800"/>
               <a:t>More hands-on experience with remote database calls</a:t>
             </a:r>
           </a:p>
           <a:p>
-            <a:pPr lvl="1">
-              <a:lnSpc>
-                <a:spcPct val="150000"/>
-              </a:lnSpc>
-            </a:pPr>
-            <a:r>
-              <a:rPr lang="en-US" dirty="0"/>
+            <a:pPr lvl="1"/>
+            <a:r>
+              <a:rPr lang="en-US" sz="1800"/>
               <a:t>Firebase is a </a:t>
             </a:r>
           </a:p>

</xml_diff>